<commit_message>
add slides about field experiment - #7
</commit_message>
<xml_diff>
--- a/docs/pptx/report.pptx
+++ b/docs/pptx/report.pptx
@@ -13,6 +13,7 @@
     <p:sldId id="261" r:id="rId7"/>
     <p:sldId id="262" r:id="rId8"/>
     <p:sldId id="263" r:id="rId9"/>
+    <p:sldId id="264" r:id="rId10"/>
   </p:sldIdLst>
   <p:sldSz cx="9144000" cy="6858000" type="screen4x3"/>
   <p:notesSz cx="6858000" cy="9144000"/>
@@ -3268,6 +3269,230 @@
             </a:pPr>
             <a:r>
               <a:rPr/>
+              <a:t>フィールド実験の介入</a:t>
+            </a:r>
+          </a:p>
+        </p:txBody>
+      </p:sp>
+      <mc:AlternateContent xmlns:mc="http://schemas.openxmlformats.org/markup-compatibility/2006">
+        <mc:Choice xmlns:a14="http://schemas.microsoft.com/office/drawing/2010/main" Requires="a14">
+          <p:sp>
+            <p:nvSpPr>
+              <p:cNvPr id="3" name="Content Placeholder 2"/>
+              <p:cNvSpPr>
+                <a:spLocks noGrp="1"/>
+              </p:cNvSpPr>
+              <p:nvPr>
+                <p:ph idx="1"/>
+              </p:nvPr>
+            </p:nvSpPr>
+            <p:spPr/>
+            <p:txBody>
+              <a:bodyPr/>
+              <a:lstStyle/>
+              <a:p>
+                <a:pPr lvl="1"/>
+                <a:r>
+                  <a:rPr/>
+                  <a:t>対象：骨髄バンクドナー確定後に「適合通知」を受け取るドナー候補者（</a:t>
+                </a:r>
+                <a14:m>
+                  <m:oMath xmlns:m="http://schemas.openxmlformats.org/officeDocument/2006/math">
+                    <m:r>
+                      <m:t>N</m:t>
+                    </m:r>
+                    <m:r>
+                      <m:rPr>
+                        <m:sty m:val="p"/>
+                      </m:rPr>
+                      <m:t>=</m:t>
+                    </m:r>
+                    <m:r>
+                      <m:t>11</m:t>
+                    </m:r>
+                    <m:r>
+                      <m:rPr>
+                        <m:sty m:val="p"/>
+                      </m:rPr>
+                      <m:t>,</m:t>
+                    </m:r>
+                    <m:r>
+                      <m:t>154</m:t>
+                    </m:r>
+                  </m:oMath>
+                </a14:m>
+                <a:r>
+                  <a:rPr/>
+                  <a:t>）</a:t>
+                </a:r>
+              </a:p>
+              <a:p>
+                <a:pPr lvl="1"/>
+                <a:r>
+                  <a:rPr/>
+                  <a:t>介入：ドナー候補者確定後に送付する「適合通知」の内容に以下のメッセージを加える</a:t>
+                </a:r>
+              </a:p>
+              <a:p>
+                <a:pPr lvl="2"/>
+                <a:r>
+                  <a:rPr/>
+                  <a:t>確率メッセージ：「１人の登録患者さんとHLA型が一致するドナー登録者は数百〜数万人に1人です。 ドナー候補者が複数みつかる場合もありますが、多くはないこともご理解頂ければ幸いです。」</a:t>
+                </a:r>
+              </a:p>
+              <a:p>
+                <a:pPr lvl="2"/>
+                <a:r>
+                  <a:rPr/>
+                  <a:t>移植患者情報：「骨髄バンクを介して移植ができる患者さんは現在約6割にとどまっています。 骨髄等を提供するドナーが早く見つかれば、その比率を高めることができます。」</a:t>
+                </a:r>
+              </a:p>
+            </p:txBody>
+          </p:sp>
+        </mc:Choice>
+      </mc:AlternateContent>
+    </p:spTree>
+  </p:cSld>
+</p:sld>
+</file>
+
+<file path=ppt/slides/slide3.xml><?xml version="1.0" encoding="utf-8"?>
+<p:sld xmlns:a="http://schemas.openxmlformats.org/drawingml/2006/main" xmlns:r="http://schemas.openxmlformats.org/officeDocument/2006/relationships" xmlns:p="http://schemas.openxmlformats.org/presentationml/2006/main">
+  <p:cSld>
+    <p:spTree>
+      <p:nvGrpSpPr>
+        <p:cNvPr id="1" name=""/>
+        <p:cNvGrpSpPr/>
+        <p:nvPr/>
+      </p:nvGrpSpPr>
+      <p:grpSpPr>
+        <a:xfrm>
+          <a:off x="0" y="0"/>
+          <a:ext cx="0" cy="0"/>
+          <a:chOff x="0" y="0"/>
+          <a:chExt cx="0" cy="0"/>
+        </a:xfrm>
+      </p:grpSpPr>
+      <p:sp>
+        <p:nvSpPr>
+          <p:cNvPr id="2" name="Title 1"/>
+          <p:cNvSpPr>
+            <a:spLocks noGrp="1"/>
+          </p:cNvSpPr>
+          <p:nvPr>
+            <p:ph type="title"/>
+          </p:nvPr>
+        </p:nvSpPr>
+        <p:spPr/>
+        <p:txBody>
+          <a:bodyPr/>
+          <a:lstStyle/>
+          <a:p>
+            <a:pPr lvl="0" marL="0" indent="0">
+              <a:buNone/>
+            </a:pPr>
+            <a:r>
+              <a:rPr/>
+              <a:t>実験群</a:t>
+            </a:r>
+          </a:p>
+        </p:txBody>
+      </p:sp>
+      <p:sp>
+        <p:nvSpPr>
+          <p:cNvPr id="3" name="Content Placeholder 2"/>
+          <p:cNvSpPr>
+            <a:spLocks noGrp="1"/>
+          </p:cNvSpPr>
+          <p:nvPr>
+            <p:ph idx="1"/>
+          </p:nvPr>
+        </p:nvSpPr>
+        <p:spPr/>
+        <p:txBody>
+          <a:bodyPr/>
+          <a:lstStyle/>
+          <a:p>
+            <a:pPr lvl="1"/>
+            <a:r>
+              <a:rPr/>
+              <a:t>A群（コントロール）：通常の適合通知</a:t>
+            </a:r>
+          </a:p>
+          <a:p>
+            <a:pPr lvl="1"/>
+            <a:r>
+              <a:rPr/>
+              <a:t>B群（トリートメント1）：通常の適合通知＋確率メッセージ</a:t>
+            </a:r>
+          </a:p>
+          <a:p>
+            <a:pPr lvl="1"/>
+            <a:r>
+              <a:rPr/>
+              <a:t>C群（トリートメント2）：通常の適合通知＋移植患者情報</a:t>
+            </a:r>
+          </a:p>
+          <a:p>
+            <a:pPr lvl="1"/>
+            <a:r>
+              <a:rPr/>
+              <a:t>D群（トリートメント3）：通常の適合通知＋確率メッセージ＋移植患者情報</a:t>
+            </a:r>
+          </a:p>
+          <a:p>
+            <a:pPr lvl="0" marL="0" indent="0">
+              <a:buNone/>
+            </a:pPr>
+            <a:r>
+              <a:rPr/>
+              <a:t>実験は2021/9～2022/2で実施し、週単位で実験群を割り当てた</a:t>
+            </a:r>
+          </a:p>
+        </p:txBody>
+      </p:sp>
+    </p:spTree>
+  </p:cSld>
+</p:sld>
+</file>
+
+<file path=ppt/slides/slide4.xml><?xml version="1.0" encoding="utf-8"?>
+<p:sld xmlns:a="http://schemas.openxmlformats.org/drawingml/2006/main" xmlns:r="http://schemas.openxmlformats.org/officeDocument/2006/relationships" xmlns:p="http://schemas.openxmlformats.org/presentationml/2006/main">
+  <p:cSld>
+    <p:spTree>
+      <p:nvGrpSpPr>
+        <p:cNvPr id="1" name=""/>
+        <p:cNvGrpSpPr/>
+        <p:nvPr/>
+      </p:nvGrpSpPr>
+      <p:grpSpPr>
+        <a:xfrm>
+          <a:off x="0" y="0"/>
+          <a:ext cx="0" cy="0"/>
+          <a:chOff x="0" y="0"/>
+          <a:chExt cx="0" cy="0"/>
+        </a:xfrm>
+      </p:grpSpPr>
+      <p:sp>
+        <p:nvSpPr>
+          <p:cNvPr id="2" name="Title 1"/>
+          <p:cNvSpPr>
+            <a:spLocks noGrp="1"/>
+          </p:cNvSpPr>
+          <p:nvPr>
+            <p:ph type="title"/>
+          </p:nvPr>
+        </p:nvSpPr>
+        <p:spPr/>
+        <p:txBody>
+          <a:bodyPr/>
+          <a:lstStyle/>
+          <a:p>
+            <a:pPr lvl="0" marL="0" indent="0">
+              <a:buNone/>
+            </a:pPr>
+            <a:r>
+              <a:rPr/>
               <a:t>割り当てスケジュール</a:t>
             </a:r>
           </a:p>
@@ -3275,7 +3500,7 @@
       </p:sp>
       <p:pic>
         <p:nvPicPr>
-          <p:cNvPr descr="C:\Users\vge00\AppData\Local\Temp\RtmpWcCICy\file3f8c74a24545.png" id="0" name="Picture 1"/>
+          <p:cNvPr descr="C:\Users\vge00\AppData\Local\Temp\RtmpWcCICy\file3f8c62f5a2f.png" id="0" name="Picture 1"/>
           <p:cNvPicPr>
             <a:picLocks noGrp="1" noChangeAspect="1"/>
           </p:cNvPicPr>
@@ -3308,7 +3533,7 @@
 </p:sld>
 </file>
 
-<file path=ppt/slides/slide3.xml><?xml version="1.0" encoding="utf-8"?>
+<file path=ppt/slides/slide5.xml><?xml version="1.0" encoding="utf-8"?>
 <p:sld xmlns:a="http://schemas.openxmlformats.org/drawingml/2006/main" xmlns:r="http://schemas.openxmlformats.org/officeDocument/2006/relationships" xmlns:p="http://schemas.openxmlformats.org/presentationml/2006/main">
   <p:cSld>
     <p:spTree>
@@ -3352,7 +3577,7 @@
       </p:sp>
       <p:pic>
         <p:nvPicPr>
-          <p:cNvPr descr="C:\Users\vge00\AppData\Local\Temp\RtmpWcCICy\file3f8c54e2558.png" id="0" name="Picture 1"/>
+          <p:cNvPr descr="C:\Users\vge00\AppData\Local\Temp\RtmpWcCICy\file3f8c50515147.png" id="0" name="Picture 1"/>
           <p:cNvPicPr>
             <a:picLocks noGrp="1" noChangeAspect="1"/>
           </p:cNvPicPr>
@@ -3385,62 +3610,7 @@
 </p:sld>
 </file>
 
-<file path=ppt/slides/slide4.xml><?xml version="1.0" encoding="utf-8"?>
-<p:sld xmlns:a="http://schemas.openxmlformats.org/drawingml/2006/main" xmlns:r="http://schemas.openxmlformats.org/officeDocument/2006/relationships" xmlns:p="http://schemas.openxmlformats.org/presentationml/2006/main">
-  <p:cSld>
-    <p:spTree>
-      <p:nvGrpSpPr>
-        <p:cNvPr id="1" name=""/>
-        <p:cNvGrpSpPr/>
-        <p:nvPr/>
-      </p:nvGrpSpPr>
-      <p:grpSpPr>
-        <a:xfrm>
-          <a:off x="0" y="0"/>
-          <a:ext cx="0" cy="0"/>
-          <a:chOff x="0" y="0"/>
-          <a:chExt cx="0" cy="0"/>
-        </a:xfrm>
-      </p:grpSpPr>
-      <p:sp>
-        <p:nvSpPr>
-          <p:cNvPr id="2" name="Title 1"/>
-          <p:cNvSpPr>
-            <a:spLocks noGrp="1"/>
-          </p:cNvSpPr>
-          <p:nvPr>
-            <p:ph type="title"/>
-          </p:nvPr>
-        </p:nvSpPr>
-        <p:spPr/>
-        <p:txBody>
-          <a:bodyPr/>
-          <a:lstStyle/>
-          <a:p>
-            <a:pPr lvl="0" marL="0" indent="0">
-              <a:buNone/>
-            </a:pPr>
-            <a:r>
-              <a:rPr/>
-              <a:t>Difference-in-mean</a:t>
-            </a:r>
-            <a:r>
-              <a:rPr/>
-              <a:t> </a:t>
-            </a:r>
-            <a:r>
-              <a:rPr/>
-              <a:t>Test</a:t>
-            </a:r>
-          </a:p>
-        </p:txBody>
-      </p:sp>
-    </p:spTree>
-  </p:cSld>
-</p:sld>
-</file>
-
-<file path=ppt/slides/slide5.xml><?xml version="1.0" encoding="utf-8"?>
+<file path=ppt/slides/slide6.xml><?xml version="1.0" encoding="utf-8"?>
 <p:sld xmlns:a="http://schemas.openxmlformats.org/drawingml/2006/main" xmlns:r="http://schemas.openxmlformats.org/officeDocument/2006/relationships" xmlns:p="http://schemas.openxmlformats.org/presentationml/2006/main">
   <p:cSld>
     <p:spTree>
@@ -3611,7 +3781,7 @@
 </p:sld>
 </file>
 
-<file path=ppt/slides/slide6.xml><?xml version="1.0" encoding="utf-8"?>
+<file path=ppt/slides/slide7.xml><?xml version="1.0" encoding="utf-8"?>
 <p:sld xmlns:a="http://schemas.openxmlformats.org/drawingml/2006/main" xmlns:r="http://schemas.openxmlformats.org/officeDocument/2006/relationships" xmlns:p="http://schemas.openxmlformats.org/presentationml/2006/main">
   <p:cSld>
     <p:spTree>
@@ -3782,7 +3952,7 @@
 </p:sld>
 </file>
 
-<file path=ppt/slides/slide7.xml><?xml version="1.0" encoding="utf-8"?>
+<file path=ppt/slides/slide8.xml><?xml version="1.0" encoding="utf-8"?>
 <p:sld xmlns:a="http://schemas.openxmlformats.org/drawingml/2006/main" xmlns:r="http://schemas.openxmlformats.org/officeDocument/2006/relationships" xmlns:p="http://schemas.openxmlformats.org/presentationml/2006/main">
   <p:cSld>
     <p:spTree>
@@ -3953,7 +4123,7 @@
 </p:sld>
 </file>
 
-<file path=ppt/slides/slide8.xml><?xml version="1.0" encoding="utf-8"?>
+<file path=ppt/slides/slide9.xml><?xml version="1.0" encoding="utf-8"?>
 <p:sld xmlns:a="http://schemas.openxmlformats.org/drawingml/2006/main" xmlns:r="http://schemas.openxmlformats.org/officeDocument/2006/relationships" xmlns:p="http://schemas.openxmlformats.org/presentationml/2006/main">
   <p:cSld>
     <p:spTree>

</xml_diff>

<commit_message>
add slides about results of t-test - #7
</commit_message>
<xml_diff>
--- a/docs/pptx/report.pptx
+++ b/docs/pptx/report.pptx
@@ -14,6 +14,11 @@
     <p:sldId id="262" r:id="rId8"/>
     <p:sldId id="263" r:id="rId9"/>
     <p:sldId id="264" r:id="rId10"/>
+    <p:sldId id="265" r:id="rId11"/>
+    <p:sldId id="266" r:id="rId12"/>
+    <p:sldId id="267" r:id="rId13"/>
+    <p:sldId id="268" r:id="rId14"/>
+    <p:sldId id="269" r:id="rId15"/>
   </p:sldIdLst>
   <p:sldSz cx="9144000" cy="6858000" type="screen4x3"/>
   <p:notesSz cx="6858000" cy="9144000"/>
@@ -3232,6 +3237,680 @@
 </p:sld>
 </file>
 
+<file path=ppt/slides/slide10.xml><?xml version="1.0" encoding="utf-8"?>
+<p:sld xmlns:a="http://schemas.openxmlformats.org/drawingml/2006/main" xmlns:r="http://schemas.openxmlformats.org/officeDocument/2006/relationships" xmlns:p="http://schemas.openxmlformats.org/presentationml/2006/main">
+  <p:cSld>
+    <p:spTree>
+      <p:nvGrpSpPr>
+        <p:cNvPr id="1" name=""/>
+        <p:cNvGrpSpPr/>
+        <p:nvPr/>
+      </p:nvGrpSpPr>
+      <p:grpSpPr>
+        <a:xfrm>
+          <a:off x="0" y="0"/>
+          <a:ext cx="0" cy="0"/>
+          <a:chOff x="0" y="0"/>
+          <a:chExt cx="0" cy="0"/>
+        </a:xfrm>
+      </p:grpSpPr>
+      <p:sp>
+        <p:nvSpPr>
+          <p:cNvPr id="2" name="Title 1"/>
+          <p:cNvSpPr>
+            <a:spLocks noGrp="1"/>
+          </p:cNvSpPr>
+          <p:nvPr>
+            <p:ph type="title"/>
+          </p:nvPr>
+        </p:nvSpPr>
+        <p:spPr/>
+        <p:txBody>
+          <a:bodyPr/>
+          <a:lstStyle/>
+          <a:p>
+            <a:pPr lvl="0" marL="0" indent="0">
+              <a:buNone/>
+            </a:pPr>
+            <a:r>
+              <a:rPr/>
+              <a:t>結果：第一候補～採取（男性）</a:t>
+            </a:r>
+          </a:p>
+        </p:txBody>
+      </p:sp>
+      <p:pic>
+        <p:nvPicPr>
+          <p:cNvPr descr="C:/Users/vge00/Desktop/JMDP-nudge-proj/RCT-Nudge/docs/pptx/report_files/figure-pptx/ttest-4-6step-male-first-1.png" id="0" name="Picture 1"/>
+          <p:cNvPicPr>
+            <a:picLocks noGrp="1" noChangeAspect="1"/>
+          </p:cNvPicPr>
+          <p:nvPr/>
+        </p:nvPicPr>
+        <p:blipFill>
+          <a:blip r:embed="rId2"/>
+          <a:stretch>
+            <a:fillRect/>
+          </a:stretch>
+        </p:blipFill>
+        <p:spPr bwMode="auto">
+          <a:xfrm>
+            <a:off x="558800" y="1600200"/>
+            <a:ext cx="8026400" cy="4013200"/>
+          </a:xfrm>
+          <a:prstGeom prst="rect">
+            <a:avLst/>
+          </a:prstGeom>
+          <a:noFill/>
+          <a:ln w="9525">
+            <a:noFill/>
+            <a:headEnd/>
+            <a:tailEnd/>
+          </a:ln>
+        </p:spPr>
+      </p:pic>
+      <p:sp>
+        <p:nvSpPr>
+          <p:cNvPr id="1" name="TextBox 3"/>
+          <p:cNvSpPr txBox="1"/>
+          <p:nvPr/>
+        </p:nvSpPr>
+        <p:spPr>
+          <a:xfrm>
+            <a:off x="457200" y="5613400"/>
+            <a:ext cx="8229600" cy="508000"/>
+          </a:xfrm>
+          <a:prstGeom prst="rect">
+            <a:avLst/>
+          </a:prstGeom>
+          <a:noFill/>
+        </p:spPr>
+        <p:txBody>
+          <a:bodyPr/>
+          <a:lstStyle/>
+          <a:p>
+            <a:pPr lvl="0" marL="0" indent="0" algn="ctr">
+              <a:buNone/>
+            </a:pPr>
+            <a:r>
+              <a:rPr/>
+              <a:t>Average</a:t>
+            </a:r>
+            <a:r>
+              <a:rPr/>
+              <a:t> </a:t>
+            </a:r>
+            <a:r>
+              <a:rPr/>
+              <a:t>of</a:t>
+            </a:r>
+            <a:r>
+              <a:rPr/>
+              <a:t> </a:t>
+            </a:r>
+            <a:r>
+              <a:rPr/>
+              <a:t>Outcomes</a:t>
+            </a:r>
+            <a:r>
+              <a:rPr/>
+              <a:t> </a:t>
+            </a:r>
+            <a:r>
+              <a:rPr/>
+              <a:t>after</a:t>
+            </a:r>
+            <a:r>
+              <a:rPr/>
+              <a:t> </a:t>
+            </a:r>
+            <a:r>
+              <a:rPr/>
+              <a:t>Donor</a:t>
+            </a:r>
+            <a:r>
+              <a:rPr/>
+              <a:t> </a:t>
+            </a:r>
+            <a:r>
+              <a:rPr/>
+              <a:t>Candidate</a:t>
+            </a:r>
+            <a:r>
+              <a:rPr/>
+              <a:t> </a:t>
+            </a:r>
+            <a:r>
+              <a:rPr/>
+              <a:t>Selection</a:t>
+            </a:r>
+            <a:r>
+              <a:rPr/>
+              <a:t> </a:t>
+            </a:r>
+            <a:r>
+              <a:rPr/>
+              <a:t>among</a:t>
+            </a:r>
+            <a:r>
+              <a:rPr/>
+              <a:t> </a:t>
+            </a:r>
+            <a:r>
+              <a:rPr/>
+              <a:t>Males</a:t>
+            </a:r>
+          </a:p>
+        </p:txBody>
+      </p:sp>
+    </p:spTree>
+  </p:cSld>
+</p:sld>
+</file>
+
+<file path=ppt/slides/slide11.xml><?xml version="1.0" encoding="utf-8"?>
+<p:sld xmlns:a="http://schemas.openxmlformats.org/drawingml/2006/main" xmlns:r="http://schemas.openxmlformats.org/officeDocument/2006/relationships" xmlns:p="http://schemas.openxmlformats.org/presentationml/2006/main">
+  <p:cSld>
+    <p:spTree>
+      <p:nvGrpSpPr>
+        <p:cNvPr id="1" name=""/>
+        <p:cNvGrpSpPr/>
+        <p:nvPr/>
+      </p:nvGrpSpPr>
+      <p:grpSpPr>
+        <a:xfrm>
+          <a:off x="0" y="0"/>
+          <a:ext cx="0" cy="0"/>
+          <a:chOff x="0" y="0"/>
+          <a:chExt cx="0" cy="0"/>
+        </a:xfrm>
+      </p:grpSpPr>
+      <p:sp>
+        <p:nvSpPr>
+          <p:cNvPr id="2" name="Title 1"/>
+          <p:cNvSpPr>
+            <a:spLocks noGrp="1"/>
+          </p:cNvSpPr>
+          <p:nvPr>
+            <p:ph type="title"/>
+          </p:nvPr>
+        </p:nvSpPr>
+        <p:spPr/>
+        <p:txBody>
+          <a:bodyPr/>
+          <a:lstStyle/>
+          <a:p>
+            <a:pPr lvl="0" marL="0" indent="0">
+              <a:buNone/>
+            </a:pPr>
+            <a:r>
+              <a:rPr/>
+              <a:t>結果：返信～確認検査（女性）</a:t>
+            </a:r>
+          </a:p>
+        </p:txBody>
+      </p:sp>
+      <p:pic>
+        <p:nvPicPr>
+          <p:cNvPr descr="C:/Users/vge00/Desktop/JMDP-nudge-proj/RCT-Nudge/docs/pptx/report_files/figure-pptx/ttest-1-3step-female-first-1.png" id="0" name="Picture 1"/>
+          <p:cNvPicPr>
+            <a:picLocks noGrp="1" noChangeAspect="1"/>
+          </p:cNvPicPr>
+          <p:nvPr/>
+        </p:nvPicPr>
+        <p:blipFill>
+          <a:blip r:embed="rId2"/>
+          <a:stretch>
+            <a:fillRect/>
+          </a:stretch>
+        </p:blipFill>
+        <p:spPr bwMode="auto">
+          <a:xfrm>
+            <a:off x="558800" y="1600200"/>
+            <a:ext cx="8026400" cy="4013200"/>
+          </a:xfrm>
+          <a:prstGeom prst="rect">
+            <a:avLst/>
+          </a:prstGeom>
+          <a:noFill/>
+          <a:ln w="9525">
+            <a:noFill/>
+            <a:headEnd/>
+            <a:tailEnd/>
+          </a:ln>
+        </p:spPr>
+      </p:pic>
+      <p:sp>
+        <p:nvSpPr>
+          <p:cNvPr id="1" name="TextBox 3"/>
+          <p:cNvSpPr txBox="1"/>
+          <p:nvPr/>
+        </p:nvSpPr>
+        <p:spPr>
+          <a:xfrm>
+            <a:off x="457200" y="5613400"/>
+            <a:ext cx="8229600" cy="508000"/>
+          </a:xfrm>
+          <a:prstGeom prst="rect">
+            <a:avLst/>
+          </a:prstGeom>
+          <a:noFill/>
+        </p:spPr>
+        <p:txBody>
+          <a:bodyPr/>
+          <a:lstStyle/>
+          <a:p>
+            <a:pPr lvl="0" marL="0" indent="0" algn="ctr">
+              <a:buNone/>
+            </a:pPr>
+            <a:r>
+              <a:rPr/>
+              <a:t>Average</a:t>
+            </a:r>
+            <a:r>
+              <a:rPr/>
+              <a:t> </a:t>
+            </a:r>
+            <a:r>
+              <a:rPr/>
+              <a:t>of</a:t>
+            </a:r>
+            <a:r>
+              <a:rPr/>
+              <a:t> </a:t>
+            </a:r>
+            <a:r>
+              <a:rPr/>
+              <a:t>Outcomes</a:t>
+            </a:r>
+            <a:r>
+              <a:rPr/>
+              <a:t> </a:t>
+            </a:r>
+            <a:r>
+              <a:rPr/>
+              <a:t>before</a:t>
+            </a:r>
+            <a:r>
+              <a:rPr/>
+              <a:t> </a:t>
+            </a:r>
+            <a:r>
+              <a:rPr/>
+              <a:t>Donor</a:t>
+            </a:r>
+            <a:r>
+              <a:rPr/>
+              <a:t> </a:t>
+            </a:r>
+            <a:r>
+              <a:rPr/>
+              <a:t>Candidate</a:t>
+            </a:r>
+            <a:r>
+              <a:rPr/>
+              <a:t> </a:t>
+            </a:r>
+            <a:r>
+              <a:rPr/>
+              <a:t>Selection</a:t>
+            </a:r>
+            <a:r>
+              <a:rPr/>
+              <a:t> </a:t>
+            </a:r>
+            <a:r>
+              <a:rPr/>
+              <a:t>among</a:t>
+            </a:r>
+            <a:r>
+              <a:rPr/>
+              <a:t> </a:t>
+            </a:r>
+            <a:r>
+              <a:rPr/>
+              <a:t>Females</a:t>
+            </a:r>
+          </a:p>
+        </p:txBody>
+      </p:sp>
+    </p:spTree>
+  </p:cSld>
+</p:sld>
+</file>
+
+<file path=ppt/slides/slide12.xml><?xml version="1.0" encoding="utf-8"?>
+<p:sld xmlns:a="http://schemas.openxmlformats.org/drawingml/2006/main" xmlns:r="http://schemas.openxmlformats.org/officeDocument/2006/relationships" xmlns:p="http://schemas.openxmlformats.org/presentationml/2006/main">
+  <p:cSld>
+    <p:spTree>
+      <p:nvGrpSpPr>
+        <p:cNvPr id="1" name=""/>
+        <p:cNvGrpSpPr/>
+        <p:nvPr/>
+      </p:nvGrpSpPr>
+      <p:grpSpPr>
+        <a:xfrm>
+          <a:off x="0" y="0"/>
+          <a:ext cx="0" cy="0"/>
+          <a:chOff x="0" y="0"/>
+          <a:chExt cx="0" cy="0"/>
+        </a:xfrm>
+      </p:grpSpPr>
+      <p:sp>
+        <p:nvSpPr>
+          <p:cNvPr id="2" name="Title 1"/>
+          <p:cNvSpPr>
+            <a:spLocks noGrp="1"/>
+          </p:cNvSpPr>
+          <p:nvPr>
+            <p:ph type="title"/>
+          </p:nvPr>
+        </p:nvSpPr>
+        <p:spPr/>
+        <p:txBody>
+          <a:bodyPr/>
+          <a:lstStyle/>
+          <a:p>
+            <a:pPr lvl="0" marL="0" indent="0">
+              <a:buNone/>
+            </a:pPr>
+            <a:r>
+              <a:rPr/>
+              <a:t>結果：第一候補～採取（女性）</a:t>
+            </a:r>
+          </a:p>
+        </p:txBody>
+      </p:sp>
+      <p:pic>
+        <p:nvPicPr>
+          <p:cNvPr descr="C:/Users/vge00/Desktop/JMDP-nudge-proj/RCT-Nudge/docs/pptx/report_files/figure-pptx/ttest-4-6step-female-first-1.png" id="0" name="Picture 1"/>
+          <p:cNvPicPr>
+            <a:picLocks noGrp="1" noChangeAspect="1"/>
+          </p:cNvPicPr>
+          <p:nvPr/>
+        </p:nvPicPr>
+        <p:blipFill>
+          <a:blip r:embed="rId2"/>
+          <a:stretch>
+            <a:fillRect/>
+          </a:stretch>
+        </p:blipFill>
+        <p:spPr bwMode="auto">
+          <a:xfrm>
+            <a:off x="558800" y="1600200"/>
+            <a:ext cx="8026400" cy="4013200"/>
+          </a:xfrm>
+          <a:prstGeom prst="rect">
+            <a:avLst/>
+          </a:prstGeom>
+          <a:noFill/>
+          <a:ln w="9525">
+            <a:noFill/>
+            <a:headEnd/>
+            <a:tailEnd/>
+          </a:ln>
+        </p:spPr>
+      </p:pic>
+      <p:sp>
+        <p:nvSpPr>
+          <p:cNvPr id="1" name="TextBox 3"/>
+          <p:cNvSpPr txBox="1"/>
+          <p:nvPr/>
+        </p:nvSpPr>
+        <p:spPr>
+          <a:xfrm>
+            <a:off x="457200" y="5613400"/>
+            <a:ext cx="8229600" cy="508000"/>
+          </a:xfrm>
+          <a:prstGeom prst="rect">
+            <a:avLst/>
+          </a:prstGeom>
+          <a:noFill/>
+        </p:spPr>
+        <p:txBody>
+          <a:bodyPr/>
+          <a:lstStyle/>
+          <a:p>
+            <a:pPr lvl="0" marL="0" indent="0" algn="ctr">
+              <a:buNone/>
+            </a:pPr>
+            <a:r>
+              <a:rPr/>
+              <a:t>Average</a:t>
+            </a:r>
+            <a:r>
+              <a:rPr/>
+              <a:t> </a:t>
+            </a:r>
+            <a:r>
+              <a:rPr/>
+              <a:t>of</a:t>
+            </a:r>
+            <a:r>
+              <a:rPr/>
+              <a:t> </a:t>
+            </a:r>
+            <a:r>
+              <a:rPr/>
+              <a:t>Outcomes</a:t>
+            </a:r>
+            <a:r>
+              <a:rPr/>
+              <a:t> </a:t>
+            </a:r>
+            <a:r>
+              <a:rPr/>
+              <a:t>after</a:t>
+            </a:r>
+            <a:r>
+              <a:rPr/>
+              <a:t> </a:t>
+            </a:r>
+            <a:r>
+              <a:rPr/>
+              <a:t>Donor</a:t>
+            </a:r>
+            <a:r>
+              <a:rPr/>
+              <a:t> </a:t>
+            </a:r>
+            <a:r>
+              <a:rPr/>
+              <a:t>Candidate</a:t>
+            </a:r>
+            <a:r>
+              <a:rPr/>
+              <a:t> </a:t>
+            </a:r>
+            <a:r>
+              <a:rPr/>
+              <a:t>Selection</a:t>
+            </a:r>
+            <a:r>
+              <a:rPr/>
+              <a:t> </a:t>
+            </a:r>
+            <a:r>
+              <a:rPr/>
+              <a:t>among</a:t>
+            </a:r>
+            <a:r>
+              <a:rPr/>
+              <a:t> </a:t>
+            </a:r>
+            <a:r>
+              <a:rPr/>
+              <a:t>Females</a:t>
+            </a:r>
+          </a:p>
+        </p:txBody>
+      </p:sp>
+    </p:spTree>
+  </p:cSld>
+</p:sld>
+</file>
+
+<file path=ppt/slides/slide13.xml><?xml version="1.0" encoding="utf-8"?>
+<p:sld xmlns:a="http://schemas.openxmlformats.org/drawingml/2006/main" xmlns:r="http://schemas.openxmlformats.org/officeDocument/2006/relationships" xmlns:p="http://schemas.openxmlformats.org/presentationml/2006/main">
+  <p:cSld>
+    <p:spTree>
+      <p:nvGrpSpPr>
+        <p:cNvPr id="1" name=""/>
+        <p:cNvGrpSpPr/>
+        <p:nvPr/>
+      </p:nvGrpSpPr>
+      <p:grpSpPr>
+        <a:xfrm>
+          <a:off x="0" y="0"/>
+          <a:ext cx="0" cy="0"/>
+          <a:chOff x="0" y="0"/>
+          <a:chExt cx="0" cy="0"/>
+        </a:xfrm>
+      </p:grpSpPr>
+      <p:sp>
+        <p:nvSpPr>
+          <p:cNvPr id="2" name="Title 1"/>
+          <p:cNvSpPr>
+            <a:spLocks noGrp="1"/>
+          </p:cNvSpPr>
+          <p:nvPr>
+            <p:ph type="title"/>
+          </p:nvPr>
+        </p:nvSpPr>
+        <p:spPr/>
+        <p:txBody>
+          <a:bodyPr/>
+          <a:lstStyle/>
+          <a:p>
+            <a:pPr lvl="0" marL="0" indent="0">
+              <a:buNone/>
+            </a:pPr>
+            <a:r>
+              <a:rPr/>
+              <a:t>結果の要約</a:t>
+            </a:r>
+          </a:p>
+        </p:txBody>
+      </p:sp>
+      <p:sp>
+        <p:nvSpPr>
+          <p:cNvPr id="3" name="Content Placeholder 2"/>
+          <p:cNvSpPr>
+            <a:spLocks noGrp="1"/>
+          </p:cNvSpPr>
+          <p:nvPr>
+            <p:ph idx="1"/>
+          </p:nvPr>
+        </p:nvSpPr>
+        <p:spPr/>
+        <p:txBody>
+          <a:bodyPr/>
+          <a:lstStyle/>
+          <a:p>
+            <a:pPr lvl="1"/>
+            <a:r>
+              <a:rPr/>
+              <a:t>男性：移植希望患者とマッチする確率が低いことを強調したメッセージが返信・意向・確認検査の実施に正の影響を与えた</a:t>
+            </a:r>
+          </a:p>
+          <a:p>
+            <a:pPr lvl="2"/>
+            <a:r>
+              <a:rPr/>
+              <a:t>この結果は年齢・都道府県・月の固定効果・週の固定効果をコントロールした回帰分析でも同じ結果となった</a:t>
+            </a:r>
+          </a:p>
+          <a:p>
+            <a:pPr lvl="1"/>
+            <a:r>
+              <a:rPr/>
+              <a:t>女性：回帰分析では、t検定で統計的に有意な群間の差が統計的に非有意となるので、頑健なメッセージの効果を得られなかった</a:t>
+            </a:r>
+          </a:p>
+        </p:txBody>
+      </p:sp>
+    </p:spTree>
+  </p:cSld>
+</p:sld>
+</file>
+
+<file path=ppt/slides/slide14.xml><?xml version="1.0" encoding="utf-8"?>
+<p:sld xmlns:a="http://schemas.openxmlformats.org/drawingml/2006/main" xmlns:r="http://schemas.openxmlformats.org/officeDocument/2006/relationships" xmlns:p="http://schemas.openxmlformats.org/presentationml/2006/main">
+  <p:cSld>
+    <p:spTree>
+      <p:nvGrpSpPr>
+        <p:cNvPr id="1" name=""/>
+        <p:cNvGrpSpPr/>
+        <p:nvPr/>
+      </p:nvGrpSpPr>
+      <p:grpSpPr>
+        <a:xfrm>
+          <a:off x="0" y="0"/>
+          <a:ext cx="0" cy="0"/>
+          <a:chOff x="0" y="0"/>
+          <a:chExt cx="0" cy="0"/>
+        </a:xfrm>
+      </p:grpSpPr>
+      <p:sp>
+        <p:nvSpPr>
+          <p:cNvPr id="2" name="Title 1"/>
+          <p:cNvSpPr>
+            <a:spLocks noGrp="1"/>
+          </p:cNvSpPr>
+          <p:nvPr>
+            <p:ph type="title"/>
+          </p:nvPr>
+        </p:nvSpPr>
+        <p:spPr/>
+        <p:txBody>
+          <a:bodyPr/>
+          <a:lstStyle/>
+          <a:p>
+            <a:pPr lvl="0" marL="0" indent="0">
+              <a:buNone/>
+            </a:pPr>
+            <a:r>
+              <a:rPr/>
+              <a:t>今後の課題</a:t>
+            </a:r>
+          </a:p>
+        </p:txBody>
+      </p:sp>
+      <p:sp>
+        <p:nvSpPr>
+          <p:cNvPr id="3" name="Content Placeholder 2"/>
+          <p:cNvSpPr>
+            <a:spLocks noGrp="1"/>
+          </p:cNvSpPr>
+          <p:nvPr>
+            <p:ph idx="1"/>
+          </p:nvPr>
+        </p:nvSpPr>
+        <p:spPr/>
+        <p:txBody>
+          <a:bodyPr/>
+          <a:lstStyle/>
+          <a:p>
+            <a:pPr lvl="1"/>
+            <a:r>
+              <a:rPr/>
+              <a:t>地域や年齢の視点からメッセージ効果の異質性を詳細に検討する。</a:t>
+            </a:r>
+          </a:p>
+          <a:p>
+            <a:pPr lvl="1"/>
+            <a:r>
+              <a:rPr/>
+              <a:t>Random causal forest (Wager and Athey, 2015)を用いた分析も検討する。</a:t>
+            </a:r>
+          </a:p>
+        </p:txBody>
+      </p:sp>
+    </p:spTree>
+  </p:cSld>
+</p:sld>
+</file>
+
 <file path=ppt/slides/slide2.xml><?xml version="1.0" encoding="utf-8"?>
 <p:sld xmlns:a="http://schemas.openxmlformats.org/drawingml/2006/main" xmlns:r="http://schemas.openxmlformats.org/officeDocument/2006/relationships" xmlns:p="http://schemas.openxmlformats.org/presentationml/2006/main">
   <p:cSld>
@@ -3500,7 +4179,7 @@
       </p:sp>
       <p:pic>
         <p:nvPicPr>
-          <p:cNvPr descr="C:\Users\vge00\AppData\Local\Temp\RtmpWcCICy\file3f8c62f5a2f.png" id="0" name="Picture 1"/>
+          <p:cNvPr descr="C:\Users\vge00\AppData\Local\Temp\RtmpWcCICy\file3f8c33145527.png" id="0" name="Picture 1"/>
           <p:cNvPicPr>
             <a:picLocks noGrp="1" noChangeAspect="1"/>
           </p:cNvPicPr>
@@ -3577,7 +4256,7 @@
       </p:sp>
       <p:pic>
         <p:nvPicPr>
-          <p:cNvPr descr="C:\Users\vge00\AppData\Local\Temp\RtmpWcCICy\file3f8c50515147.png" id="0" name="Picture 1"/>
+          <p:cNvPr descr="C:\Users\vge00\AppData\Local\Temp\RtmpWcCICy\file3f8c7aa1c.png" id="0" name="Picture 1"/>
           <p:cNvPicPr>
             <a:picLocks noGrp="1" noChangeAspect="1"/>
           </p:cNvPicPr>
@@ -3647,7 +4326,297 @@
             </a:pPr>
             <a:r>
               <a:rPr/>
-              <a:t>男性１</a:t>
+              <a:t>アウトカム変数(1)</a:t>
+            </a:r>
+          </a:p>
+        </p:txBody>
+      </p:sp>
+      <p:sp>
+        <p:nvSpPr>
+          <p:cNvPr id="3" name="Content Placeholder 2"/>
+          <p:cNvSpPr>
+            <a:spLocks noGrp="1"/>
+          </p:cNvSpPr>
+          <p:nvPr>
+            <p:ph idx="1"/>
+          </p:nvPr>
+        </p:nvSpPr>
+        <p:spPr/>
+        <p:txBody>
+          <a:bodyPr/>
+          <a:lstStyle/>
+          <a:p>
+            <a:pPr lvl="1">
+              <a:buAutoNum type="arabicPeriod"/>
+            </a:pPr>
+            <a:r>
+              <a:rPr/>
+              <a:t>返信：適合通知に返信したならば1を取る二値変数</a:t>
+            </a:r>
+          </a:p>
+          <a:p>
+            <a:pPr lvl="1">
+              <a:buAutoNum type="arabicPeriod"/>
+            </a:pPr>
+            <a:r>
+              <a:rPr/>
+              <a:t>意向あり：提供の意向を示して適合通知に返信したならば1を取る二値変数</a:t>
+            </a:r>
+          </a:p>
+          <a:p>
+            <a:pPr lvl="1">
+              <a:buAutoNum type="arabicPeriod"/>
+            </a:pPr>
+            <a:r>
+              <a:rPr/>
+              <a:t>確認検査：確認検査を実施したならば1を取る二値変数 （確認検査が省略されたケースは実施したとみなす）</a:t>
+            </a:r>
+          </a:p>
+          <a:p>
+            <a:pPr lvl="0" marL="0" indent="0">
+              <a:buNone/>
+            </a:pPr>
+            <a:r>
+              <a:rPr/>
+              <a:t>ドナーの意向と無関係な理由（患者理由）によって、 返信や確認検査をできなかった人を分析対象から除外する</a:t>
+            </a:r>
+          </a:p>
+        </p:txBody>
+      </p:sp>
+    </p:spTree>
+  </p:cSld>
+</p:sld>
+</file>
+
+<file path=ppt/slides/slide7.xml><?xml version="1.0" encoding="utf-8"?>
+<p:sld xmlns:a="http://schemas.openxmlformats.org/drawingml/2006/main" xmlns:r="http://schemas.openxmlformats.org/officeDocument/2006/relationships" xmlns:p="http://schemas.openxmlformats.org/presentationml/2006/main">
+  <p:cSld>
+    <p:spTree>
+      <p:nvGrpSpPr>
+        <p:cNvPr id="1" name=""/>
+        <p:cNvGrpSpPr/>
+        <p:nvPr/>
+      </p:nvGrpSpPr>
+      <p:grpSpPr>
+        <a:xfrm>
+          <a:off x="0" y="0"/>
+          <a:ext cx="0" cy="0"/>
+          <a:chOff x="0" y="0"/>
+          <a:chExt cx="0" cy="0"/>
+        </a:xfrm>
+      </p:grpSpPr>
+      <p:sp>
+        <p:nvSpPr>
+          <p:cNvPr id="2" name="Title 1"/>
+          <p:cNvSpPr>
+            <a:spLocks noGrp="1"/>
+          </p:cNvSpPr>
+          <p:nvPr>
+            <p:ph type="title"/>
+          </p:nvPr>
+        </p:nvSpPr>
+        <p:spPr/>
+        <p:txBody>
+          <a:bodyPr/>
+          <a:lstStyle/>
+          <a:p>
+            <a:pPr lvl="0" marL="0" indent="0">
+              <a:buNone/>
+            </a:pPr>
+            <a:r>
+              <a:rPr/>
+              <a:t>アウトカム変数(2)</a:t>
+            </a:r>
+          </a:p>
+        </p:txBody>
+      </p:sp>
+      <p:sp>
+        <p:nvSpPr>
+          <p:cNvPr id="3" name="Content Placeholder 2"/>
+          <p:cNvSpPr>
+            <a:spLocks noGrp="1"/>
+          </p:cNvSpPr>
+          <p:nvPr>
+            <p:ph idx="1"/>
+          </p:nvPr>
+        </p:nvSpPr>
+        <p:spPr/>
+        <p:txBody>
+          <a:bodyPr/>
+          <a:lstStyle/>
+          <a:p>
+            <a:pPr lvl="1">
+              <a:buAutoNum startAt="4" type="arabicPeriod"/>
+            </a:pPr>
+            <a:r>
+              <a:rPr/>
+              <a:t>第一候補：第一候補に選ばれたならば1を取る二値変数</a:t>
+            </a:r>
+          </a:p>
+          <a:p>
+            <a:pPr lvl="1">
+              <a:buAutoNum startAt="4" type="arabicPeriod"/>
+            </a:pPr>
+            <a:r>
+              <a:rPr/>
+              <a:t>最終同意：最終同意まで至ったら1を取る二値変数</a:t>
+            </a:r>
+          </a:p>
+          <a:p>
+            <a:pPr lvl="1">
+              <a:buAutoNum startAt="4" type="arabicPeriod"/>
+            </a:pPr>
+            <a:r>
+              <a:rPr/>
+              <a:t>採取：採取まで至ったら1を取る二値変数</a:t>
+            </a:r>
+          </a:p>
+          <a:p>
+            <a:pPr lvl="0" marL="0" indent="0">
+              <a:buNone/>
+            </a:pPr>
+            <a:r>
+              <a:rPr/>
+              <a:t>ドナーの意向と無関係な理由（患者理由・ドナー健康理由）によって、 第一候補や採取まで至らなかった人を分析対象から除外する</a:t>
+            </a:r>
+          </a:p>
+        </p:txBody>
+      </p:sp>
+    </p:spTree>
+  </p:cSld>
+</p:sld>
+</file>
+
+<file path=ppt/slides/slide8.xml><?xml version="1.0" encoding="utf-8"?>
+<p:sld xmlns:a="http://schemas.openxmlformats.org/drawingml/2006/main" xmlns:r="http://schemas.openxmlformats.org/officeDocument/2006/relationships" xmlns:p="http://schemas.openxmlformats.org/presentationml/2006/main">
+  <p:cSld>
+    <p:spTree>
+      <p:nvGrpSpPr>
+        <p:cNvPr id="1" name=""/>
+        <p:cNvGrpSpPr/>
+        <p:nvPr/>
+      </p:nvGrpSpPr>
+      <p:grpSpPr>
+        <a:xfrm>
+          <a:off x="0" y="0"/>
+          <a:ext cx="0" cy="0"/>
+          <a:chOff x="0" y="0"/>
+          <a:chExt cx="0" cy="0"/>
+        </a:xfrm>
+      </p:grpSpPr>
+      <p:sp>
+        <p:nvSpPr>
+          <p:cNvPr id="2" name="Title 1"/>
+          <p:cNvSpPr>
+            <a:spLocks noGrp="1"/>
+          </p:cNvSpPr>
+          <p:nvPr>
+            <p:ph type="title"/>
+          </p:nvPr>
+        </p:nvSpPr>
+        <p:spPr/>
+        <p:txBody>
+          <a:bodyPr/>
+          <a:lstStyle/>
+          <a:p>
+            <a:pPr lvl="0" marL="0" indent="0">
+              <a:buNone/>
+            </a:pPr>
+            <a:r>
+              <a:rPr/>
+              <a:t>Difference-in-mean</a:t>
+            </a:r>
+            <a:r>
+              <a:rPr/>
+              <a:t> </a:t>
+            </a:r>
+            <a:r>
+              <a:rPr/>
+              <a:t>Test</a:t>
+            </a:r>
+          </a:p>
+        </p:txBody>
+      </p:sp>
+      <p:sp>
+        <p:nvSpPr>
+          <p:cNvPr id="3" name="Content Placeholder 2"/>
+          <p:cNvSpPr>
+            <a:spLocks noGrp="1"/>
+          </p:cNvSpPr>
+          <p:nvPr>
+            <p:ph idx="1"/>
+          </p:nvPr>
+        </p:nvSpPr>
+        <p:spPr/>
+        <p:txBody>
+          <a:bodyPr/>
+          <a:lstStyle/>
+          <a:p>
+            <a:pPr lvl="1"/>
+            <a:r>
+              <a:rPr/>
+              <a:t>二群の平均値の差がゼロであるという帰無仮説をt検定で検定した</a:t>
+            </a:r>
+          </a:p>
+          <a:p>
+            <a:pPr lvl="1"/>
+            <a:r>
+              <a:rPr/>
+              <a:t>初めてコーディネートを経験する人に限定した</a:t>
+            </a:r>
+          </a:p>
+          <a:p>
+            <a:pPr lvl="1"/>
+            <a:r>
+              <a:rPr/>
+              <a:t>男性と女性にサンプルを分けて、分析した</a:t>
+            </a:r>
+          </a:p>
+        </p:txBody>
+      </p:sp>
+    </p:spTree>
+  </p:cSld>
+</p:sld>
+</file>
+
+<file path=ppt/slides/slide9.xml><?xml version="1.0" encoding="utf-8"?>
+<p:sld xmlns:a="http://schemas.openxmlformats.org/drawingml/2006/main" xmlns:r="http://schemas.openxmlformats.org/officeDocument/2006/relationships" xmlns:p="http://schemas.openxmlformats.org/presentationml/2006/main">
+  <p:cSld>
+    <p:spTree>
+      <p:nvGrpSpPr>
+        <p:cNvPr id="1" name=""/>
+        <p:cNvGrpSpPr/>
+        <p:nvPr/>
+      </p:nvGrpSpPr>
+      <p:grpSpPr>
+        <a:xfrm>
+          <a:off x="0" y="0"/>
+          <a:ext cx="0" cy="0"/>
+          <a:chOff x="0" y="0"/>
+          <a:chExt cx="0" cy="0"/>
+        </a:xfrm>
+      </p:grpSpPr>
+      <p:sp>
+        <p:nvSpPr>
+          <p:cNvPr id="2" name="Title 1"/>
+          <p:cNvSpPr>
+            <a:spLocks noGrp="1"/>
+          </p:cNvSpPr>
+          <p:nvPr>
+            <p:ph type="title"/>
+          </p:nvPr>
+        </p:nvSpPr>
+        <p:spPr/>
+        <p:txBody>
+          <a:bodyPr/>
+          <a:lstStyle/>
+          <a:p>
+            <a:pPr lvl="0" marL="0" indent="0">
+              <a:buNone/>
+            </a:pPr>
+            <a:r>
+              <a:rPr/>
+              <a:t>結果：返信～確認検査（男性）</a:t>
             </a:r>
           </a:p>
         </p:txBody>
@@ -3772,519 +4741,6 @@
             <a:r>
               <a:rPr/>
               <a:t>Males</a:t>
-            </a:r>
-          </a:p>
-        </p:txBody>
-      </p:sp>
-    </p:spTree>
-  </p:cSld>
-</p:sld>
-</file>
-
-<file path=ppt/slides/slide7.xml><?xml version="1.0" encoding="utf-8"?>
-<p:sld xmlns:a="http://schemas.openxmlformats.org/drawingml/2006/main" xmlns:r="http://schemas.openxmlformats.org/officeDocument/2006/relationships" xmlns:p="http://schemas.openxmlformats.org/presentationml/2006/main">
-  <p:cSld>
-    <p:spTree>
-      <p:nvGrpSpPr>
-        <p:cNvPr id="1" name=""/>
-        <p:cNvGrpSpPr/>
-        <p:nvPr/>
-      </p:nvGrpSpPr>
-      <p:grpSpPr>
-        <a:xfrm>
-          <a:off x="0" y="0"/>
-          <a:ext cx="0" cy="0"/>
-          <a:chOff x="0" y="0"/>
-          <a:chExt cx="0" cy="0"/>
-        </a:xfrm>
-      </p:grpSpPr>
-      <p:sp>
-        <p:nvSpPr>
-          <p:cNvPr id="2" name="Title 1"/>
-          <p:cNvSpPr>
-            <a:spLocks noGrp="1"/>
-          </p:cNvSpPr>
-          <p:nvPr>
-            <p:ph type="title"/>
-          </p:nvPr>
-        </p:nvSpPr>
-        <p:spPr/>
-        <p:txBody>
-          <a:bodyPr/>
-          <a:lstStyle/>
-          <a:p>
-            <a:pPr lvl="0" marL="0" indent="0">
-              <a:buNone/>
-            </a:pPr>
-            <a:r>
-              <a:rPr/>
-              <a:t>男性２</a:t>
-            </a:r>
-          </a:p>
-        </p:txBody>
-      </p:sp>
-      <p:pic>
-        <p:nvPicPr>
-          <p:cNvPr descr="C:/Users/vge00/Desktop/JMDP-nudge-proj/RCT-Nudge/docs/pptx/report_files/figure-pptx/ttest-4-6step-male-first-1.png" id="0" name="Picture 1"/>
-          <p:cNvPicPr>
-            <a:picLocks noGrp="1" noChangeAspect="1"/>
-          </p:cNvPicPr>
-          <p:nvPr/>
-        </p:nvPicPr>
-        <p:blipFill>
-          <a:blip r:embed="rId2"/>
-          <a:stretch>
-            <a:fillRect/>
-          </a:stretch>
-        </p:blipFill>
-        <p:spPr bwMode="auto">
-          <a:xfrm>
-            <a:off x="558800" y="1600200"/>
-            <a:ext cx="8026400" cy="4013200"/>
-          </a:xfrm>
-          <a:prstGeom prst="rect">
-            <a:avLst/>
-          </a:prstGeom>
-          <a:noFill/>
-          <a:ln w="9525">
-            <a:noFill/>
-            <a:headEnd/>
-            <a:tailEnd/>
-          </a:ln>
-        </p:spPr>
-      </p:pic>
-      <p:sp>
-        <p:nvSpPr>
-          <p:cNvPr id="1" name="TextBox 3"/>
-          <p:cNvSpPr txBox="1"/>
-          <p:nvPr/>
-        </p:nvSpPr>
-        <p:spPr>
-          <a:xfrm>
-            <a:off x="457200" y="5613400"/>
-            <a:ext cx="8229600" cy="508000"/>
-          </a:xfrm>
-          <a:prstGeom prst="rect">
-            <a:avLst/>
-          </a:prstGeom>
-          <a:noFill/>
-        </p:spPr>
-        <p:txBody>
-          <a:bodyPr/>
-          <a:lstStyle/>
-          <a:p>
-            <a:pPr lvl="0" marL="0" indent="0" algn="ctr">
-              <a:buNone/>
-            </a:pPr>
-            <a:r>
-              <a:rPr/>
-              <a:t>Average</a:t>
-            </a:r>
-            <a:r>
-              <a:rPr/>
-              <a:t> </a:t>
-            </a:r>
-            <a:r>
-              <a:rPr/>
-              <a:t>of</a:t>
-            </a:r>
-            <a:r>
-              <a:rPr/>
-              <a:t> </a:t>
-            </a:r>
-            <a:r>
-              <a:rPr/>
-              <a:t>Outcomes</a:t>
-            </a:r>
-            <a:r>
-              <a:rPr/>
-              <a:t> </a:t>
-            </a:r>
-            <a:r>
-              <a:rPr/>
-              <a:t>after</a:t>
-            </a:r>
-            <a:r>
-              <a:rPr/>
-              <a:t> </a:t>
-            </a:r>
-            <a:r>
-              <a:rPr/>
-              <a:t>Donor</a:t>
-            </a:r>
-            <a:r>
-              <a:rPr/>
-              <a:t> </a:t>
-            </a:r>
-            <a:r>
-              <a:rPr/>
-              <a:t>Candidate</a:t>
-            </a:r>
-            <a:r>
-              <a:rPr/>
-              <a:t> </a:t>
-            </a:r>
-            <a:r>
-              <a:rPr/>
-              <a:t>Selection</a:t>
-            </a:r>
-            <a:r>
-              <a:rPr/>
-              <a:t> </a:t>
-            </a:r>
-            <a:r>
-              <a:rPr/>
-              <a:t>among</a:t>
-            </a:r>
-            <a:r>
-              <a:rPr/>
-              <a:t> </a:t>
-            </a:r>
-            <a:r>
-              <a:rPr/>
-              <a:t>Males</a:t>
-            </a:r>
-          </a:p>
-        </p:txBody>
-      </p:sp>
-    </p:spTree>
-  </p:cSld>
-</p:sld>
-</file>
-
-<file path=ppt/slides/slide8.xml><?xml version="1.0" encoding="utf-8"?>
-<p:sld xmlns:a="http://schemas.openxmlformats.org/drawingml/2006/main" xmlns:r="http://schemas.openxmlformats.org/officeDocument/2006/relationships" xmlns:p="http://schemas.openxmlformats.org/presentationml/2006/main">
-  <p:cSld>
-    <p:spTree>
-      <p:nvGrpSpPr>
-        <p:cNvPr id="1" name=""/>
-        <p:cNvGrpSpPr/>
-        <p:nvPr/>
-      </p:nvGrpSpPr>
-      <p:grpSpPr>
-        <a:xfrm>
-          <a:off x="0" y="0"/>
-          <a:ext cx="0" cy="0"/>
-          <a:chOff x="0" y="0"/>
-          <a:chExt cx="0" cy="0"/>
-        </a:xfrm>
-      </p:grpSpPr>
-      <p:sp>
-        <p:nvSpPr>
-          <p:cNvPr id="2" name="Title 1"/>
-          <p:cNvSpPr>
-            <a:spLocks noGrp="1"/>
-          </p:cNvSpPr>
-          <p:nvPr>
-            <p:ph type="title"/>
-          </p:nvPr>
-        </p:nvSpPr>
-        <p:spPr/>
-        <p:txBody>
-          <a:bodyPr/>
-          <a:lstStyle/>
-          <a:p>
-            <a:pPr lvl="0" marL="0" indent="0">
-              <a:buNone/>
-            </a:pPr>
-            <a:r>
-              <a:rPr/>
-              <a:t>女性１</a:t>
-            </a:r>
-          </a:p>
-        </p:txBody>
-      </p:sp>
-      <p:pic>
-        <p:nvPicPr>
-          <p:cNvPr descr="C:/Users/vge00/Desktop/JMDP-nudge-proj/RCT-Nudge/docs/pptx/report_files/figure-pptx/ttest-1-3step-female-first-1.png" id="0" name="Picture 1"/>
-          <p:cNvPicPr>
-            <a:picLocks noGrp="1" noChangeAspect="1"/>
-          </p:cNvPicPr>
-          <p:nvPr/>
-        </p:nvPicPr>
-        <p:blipFill>
-          <a:blip r:embed="rId2"/>
-          <a:stretch>
-            <a:fillRect/>
-          </a:stretch>
-        </p:blipFill>
-        <p:spPr bwMode="auto">
-          <a:xfrm>
-            <a:off x="558800" y="1600200"/>
-            <a:ext cx="8026400" cy="4013200"/>
-          </a:xfrm>
-          <a:prstGeom prst="rect">
-            <a:avLst/>
-          </a:prstGeom>
-          <a:noFill/>
-          <a:ln w="9525">
-            <a:noFill/>
-            <a:headEnd/>
-            <a:tailEnd/>
-          </a:ln>
-        </p:spPr>
-      </p:pic>
-      <p:sp>
-        <p:nvSpPr>
-          <p:cNvPr id="1" name="TextBox 3"/>
-          <p:cNvSpPr txBox="1"/>
-          <p:nvPr/>
-        </p:nvSpPr>
-        <p:spPr>
-          <a:xfrm>
-            <a:off x="457200" y="5613400"/>
-            <a:ext cx="8229600" cy="508000"/>
-          </a:xfrm>
-          <a:prstGeom prst="rect">
-            <a:avLst/>
-          </a:prstGeom>
-          <a:noFill/>
-        </p:spPr>
-        <p:txBody>
-          <a:bodyPr/>
-          <a:lstStyle/>
-          <a:p>
-            <a:pPr lvl="0" marL="0" indent="0" algn="ctr">
-              <a:buNone/>
-            </a:pPr>
-            <a:r>
-              <a:rPr/>
-              <a:t>Average</a:t>
-            </a:r>
-            <a:r>
-              <a:rPr/>
-              <a:t> </a:t>
-            </a:r>
-            <a:r>
-              <a:rPr/>
-              <a:t>of</a:t>
-            </a:r>
-            <a:r>
-              <a:rPr/>
-              <a:t> </a:t>
-            </a:r>
-            <a:r>
-              <a:rPr/>
-              <a:t>Outcomes</a:t>
-            </a:r>
-            <a:r>
-              <a:rPr/>
-              <a:t> </a:t>
-            </a:r>
-            <a:r>
-              <a:rPr/>
-              <a:t>before</a:t>
-            </a:r>
-            <a:r>
-              <a:rPr/>
-              <a:t> </a:t>
-            </a:r>
-            <a:r>
-              <a:rPr/>
-              <a:t>Donor</a:t>
-            </a:r>
-            <a:r>
-              <a:rPr/>
-              <a:t> </a:t>
-            </a:r>
-            <a:r>
-              <a:rPr/>
-              <a:t>Candidate</a:t>
-            </a:r>
-            <a:r>
-              <a:rPr/>
-              <a:t> </a:t>
-            </a:r>
-            <a:r>
-              <a:rPr/>
-              <a:t>Selection</a:t>
-            </a:r>
-            <a:r>
-              <a:rPr/>
-              <a:t> </a:t>
-            </a:r>
-            <a:r>
-              <a:rPr/>
-              <a:t>among</a:t>
-            </a:r>
-            <a:r>
-              <a:rPr/>
-              <a:t> </a:t>
-            </a:r>
-            <a:r>
-              <a:rPr/>
-              <a:t>Females</a:t>
-            </a:r>
-          </a:p>
-        </p:txBody>
-      </p:sp>
-    </p:spTree>
-  </p:cSld>
-</p:sld>
-</file>
-
-<file path=ppt/slides/slide9.xml><?xml version="1.0" encoding="utf-8"?>
-<p:sld xmlns:a="http://schemas.openxmlformats.org/drawingml/2006/main" xmlns:r="http://schemas.openxmlformats.org/officeDocument/2006/relationships" xmlns:p="http://schemas.openxmlformats.org/presentationml/2006/main">
-  <p:cSld>
-    <p:spTree>
-      <p:nvGrpSpPr>
-        <p:cNvPr id="1" name=""/>
-        <p:cNvGrpSpPr/>
-        <p:nvPr/>
-      </p:nvGrpSpPr>
-      <p:grpSpPr>
-        <a:xfrm>
-          <a:off x="0" y="0"/>
-          <a:ext cx="0" cy="0"/>
-          <a:chOff x="0" y="0"/>
-          <a:chExt cx="0" cy="0"/>
-        </a:xfrm>
-      </p:grpSpPr>
-      <p:sp>
-        <p:nvSpPr>
-          <p:cNvPr id="2" name="Title 1"/>
-          <p:cNvSpPr>
-            <a:spLocks noGrp="1"/>
-          </p:cNvSpPr>
-          <p:nvPr>
-            <p:ph type="title"/>
-          </p:nvPr>
-        </p:nvSpPr>
-        <p:spPr/>
-        <p:txBody>
-          <a:bodyPr/>
-          <a:lstStyle/>
-          <a:p>
-            <a:pPr lvl="0" marL="0" indent="0">
-              <a:buNone/>
-            </a:pPr>
-            <a:r>
-              <a:rPr/>
-              <a:t>女性２</a:t>
-            </a:r>
-          </a:p>
-        </p:txBody>
-      </p:sp>
-      <p:pic>
-        <p:nvPicPr>
-          <p:cNvPr descr="C:/Users/vge00/Desktop/JMDP-nudge-proj/RCT-Nudge/docs/pptx/report_files/figure-pptx/ttest-4-6step-female-first-1.png" id="0" name="Picture 1"/>
-          <p:cNvPicPr>
-            <a:picLocks noGrp="1" noChangeAspect="1"/>
-          </p:cNvPicPr>
-          <p:nvPr/>
-        </p:nvPicPr>
-        <p:blipFill>
-          <a:blip r:embed="rId2"/>
-          <a:stretch>
-            <a:fillRect/>
-          </a:stretch>
-        </p:blipFill>
-        <p:spPr bwMode="auto">
-          <a:xfrm>
-            <a:off x="558800" y="1600200"/>
-            <a:ext cx="8026400" cy="4013200"/>
-          </a:xfrm>
-          <a:prstGeom prst="rect">
-            <a:avLst/>
-          </a:prstGeom>
-          <a:noFill/>
-          <a:ln w="9525">
-            <a:noFill/>
-            <a:headEnd/>
-            <a:tailEnd/>
-          </a:ln>
-        </p:spPr>
-      </p:pic>
-      <p:sp>
-        <p:nvSpPr>
-          <p:cNvPr id="1" name="TextBox 3"/>
-          <p:cNvSpPr txBox="1"/>
-          <p:nvPr/>
-        </p:nvSpPr>
-        <p:spPr>
-          <a:xfrm>
-            <a:off x="457200" y="5613400"/>
-            <a:ext cx="8229600" cy="508000"/>
-          </a:xfrm>
-          <a:prstGeom prst="rect">
-            <a:avLst/>
-          </a:prstGeom>
-          <a:noFill/>
-        </p:spPr>
-        <p:txBody>
-          <a:bodyPr/>
-          <a:lstStyle/>
-          <a:p>
-            <a:pPr lvl="0" marL="0" indent="0" algn="ctr">
-              <a:buNone/>
-            </a:pPr>
-            <a:r>
-              <a:rPr/>
-              <a:t>Average</a:t>
-            </a:r>
-            <a:r>
-              <a:rPr/>
-              <a:t> </a:t>
-            </a:r>
-            <a:r>
-              <a:rPr/>
-              <a:t>of</a:t>
-            </a:r>
-            <a:r>
-              <a:rPr/>
-              <a:t> </a:t>
-            </a:r>
-            <a:r>
-              <a:rPr/>
-              <a:t>Outcomes</a:t>
-            </a:r>
-            <a:r>
-              <a:rPr/>
-              <a:t> </a:t>
-            </a:r>
-            <a:r>
-              <a:rPr/>
-              <a:t>after</a:t>
-            </a:r>
-            <a:r>
-              <a:rPr/>
-              <a:t> </a:t>
-            </a:r>
-            <a:r>
-              <a:rPr/>
-              <a:t>Donor</a:t>
-            </a:r>
-            <a:r>
-              <a:rPr/>
-              <a:t> </a:t>
-            </a:r>
-            <a:r>
-              <a:rPr/>
-              <a:t>Candidate</a:t>
-            </a:r>
-            <a:r>
-              <a:rPr/>
-              <a:t> </a:t>
-            </a:r>
-            <a:r>
-              <a:rPr/>
-              <a:t>Selection</a:t>
-            </a:r>
-            <a:r>
-              <a:rPr/>
-              <a:t> </a:t>
-            </a:r>
-            <a:r>
-              <a:rPr/>
-              <a:t>among</a:t>
-            </a:r>
-            <a:r>
-              <a:rPr/>
-              <a:t> </a:t>
-            </a:r>
-            <a:r>
-              <a:rPr/>
-              <a:t>Females</a:t>
             </a:r>
           </a:p>
         </p:txBody>

</xml_diff>

<commit_message>
add N in plots of diff-in-mean test - #7
</commit_message>
<xml_diff>
--- a/docs/pptx/report.pptx
+++ b/docs/pptx/report.pptx
@@ -20,7 +20,7 @@
     <p:sldId id="268" r:id="rId14"/>
     <p:sldId id="269" r:id="rId15"/>
   </p:sldIdLst>
-  <p:sldSz cx="9144000" cy="6858000" type="screen4x3"/>
+  <p:sldSz cx="9144000" cy="5143500" type="screen16x9"/>
   <p:notesSz cx="6858000" cy="9144000"/>
   <p:defaultTextStyle>
     <a:defPPr>
@@ -120,12 +120,12 @@
   <p:extLst>
     <p:ext uri="{EFAFB233-063F-42B5-8137-9DF3F51BA10A}">
       <p15:sldGuideLst xmlns:p15="http://schemas.microsoft.com/office/powerpoint/2012/main">
-        <p15:guide id="1" orient="horz" pos="2160">
+        <p15:guide id="1" orient="horz" pos="1620" userDrawn="1">
           <p15:clr>
             <a:srgbClr val="A4A3A4"/>
           </p15:clr>
         </p15:guide>
-        <p15:guide id="2" pos="2880">
+        <p15:guide id="2" pos="2880" userDrawn="1">
           <p15:clr>
             <a:srgbClr val="A4A3A4"/>
           </p15:clr>
@@ -165,8 +165,8 @@
         </p:nvSpPr>
         <p:spPr>
           <a:xfrm>
-            <a:off x="685800" y="2130425"/>
-            <a:ext cx="7772400" cy="1470025"/>
+            <a:off x="685800" y="1597819"/>
+            <a:ext cx="7772400" cy="1102519"/>
           </a:xfrm>
         </p:spPr>
         <p:txBody>
@@ -174,10 +174,9 @@
           <a:lstStyle/>
           <a:p>
             <a:r>
-              <a:rPr lang="en-US" smtClean="0"/>
+              <a:rPr lang="en-US"/>
               <a:t>Click to edit Master title style</a:t>
             </a:r>
-            <a:endParaRPr lang="en-US"/>
           </a:p>
         </p:txBody>
       </p:sp>
@@ -193,8 +192,8 @@
         </p:nvSpPr>
         <p:spPr>
           <a:xfrm>
-            <a:off x="1371600" y="3886200"/>
-            <a:ext cx="6400800" cy="1752600"/>
+            <a:off x="1371600" y="2914650"/>
+            <a:ext cx="6400800" cy="1314450"/>
           </a:xfrm>
         </p:spPr>
         <p:txBody>
@@ -210,7 +209,7 @@
                 </a:solidFill>
               </a:defRPr>
             </a:lvl1pPr>
-            <a:lvl2pPr marL="457200" indent="0" algn="ctr">
+            <a:lvl2pPr marL="342900" indent="0" algn="ctr">
               <a:buNone/>
               <a:defRPr>
                 <a:solidFill>
@@ -220,7 +219,7 @@
                 </a:solidFill>
               </a:defRPr>
             </a:lvl2pPr>
-            <a:lvl3pPr marL="914400" indent="0" algn="ctr">
+            <a:lvl3pPr marL="685800" indent="0" algn="ctr">
               <a:buNone/>
               <a:defRPr>
                 <a:solidFill>
@@ -230,7 +229,7 @@
                 </a:solidFill>
               </a:defRPr>
             </a:lvl3pPr>
-            <a:lvl4pPr marL="1371600" indent="0" algn="ctr">
+            <a:lvl4pPr marL="1028700" indent="0" algn="ctr">
               <a:buNone/>
               <a:defRPr>
                 <a:solidFill>
@@ -240,7 +239,7 @@
                 </a:solidFill>
               </a:defRPr>
             </a:lvl4pPr>
-            <a:lvl5pPr marL="1828800" indent="0" algn="ctr">
+            <a:lvl5pPr marL="1371600" indent="0" algn="ctr">
               <a:buNone/>
               <a:defRPr>
                 <a:solidFill>
@@ -250,7 +249,7 @@
                 </a:solidFill>
               </a:defRPr>
             </a:lvl5pPr>
-            <a:lvl6pPr marL="2286000" indent="0" algn="ctr">
+            <a:lvl6pPr marL="1714500" indent="0" algn="ctr">
               <a:buNone/>
               <a:defRPr>
                 <a:solidFill>
@@ -260,7 +259,7 @@
                 </a:solidFill>
               </a:defRPr>
             </a:lvl6pPr>
-            <a:lvl7pPr marL="2743200" indent="0" algn="ctr">
+            <a:lvl7pPr marL="2057400" indent="0" algn="ctr">
               <a:buNone/>
               <a:defRPr>
                 <a:solidFill>
@@ -270,7 +269,7 @@
                 </a:solidFill>
               </a:defRPr>
             </a:lvl7pPr>
-            <a:lvl8pPr marL="3200400" indent="0" algn="ctr">
+            <a:lvl8pPr marL="2400300" indent="0" algn="ctr">
               <a:buNone/>
               <a:defRPr>
                 <a:solidFill>
@@ -280,7 +279,7 @@
                 </a:solidFill>
               </a:defRPr>
             </a:lvl8pPr>
-            <a:lvl9pPr marL="3657600" indent="0" algn="ctr">
+            <a:lvl9pPr marL="2743200" indent="0" algn="ctr">
               <a:buNone/>
               <a:defRPr>
                 <a:solidFill>
@@ -293,10 +292,9 @@
           </a:lstStyle>
           <a:p>
             <a:r>
-              <a:rPr lang="en-US" smtClean="0"/>
+              <a:rPr lang="en-US"/>
               <a:t>Click to edit Master subtitle style</a:t>
             </a:r>
-            <a:endParaRPr lang="en-US"/>
           </a:p>
         </p:txBody>
       </p:sp>
@@ -317,7 +315,7 @@
           <a:p>
             <a:fld id="{241EB5C9-1307-BA42-ABA2-0BC069CD8E7F}" type="datetimeFigureOut">
               <a:rPr lang="en-US" smtClean="0"/>
-              <a:t>4/5/2019</a:t>
+              <a:t>1/2/22</a:t>
             </a:fld>
             <a:endParaRPr lang="en-US"/>
           </a:p>
@@ -411,10 +409,9 @@
           <a:lstStyle/>
           <a:p>
             <a:r>
-              <a:rPr lang="en-US" smtClean="0"/>
+              <a:rPr lang="en-US"/>
               <a:t>Click to edit Master title style</a:t>
             </a:r>
-            <a:endParaRPr lang="en-US"/>
           </a:p>
         </p:txBody>
       </p:sp>
@@ -435,38 +432,37 @@
           <a:p>
             <a:pPr lvl="0"/>
             <a:r>
-              <a:rPr lang="en-US" smtClean="0"/>
+              <a:rPr lang="en-US"/>
               <a:t>Click to edit Master text styles</a:t>
             </a:r>
           </a:p>
           <a:p>
             <a:pPr lvl="1"/>
             <a:r>
-              <a:rPr lang="en-US" smtClean="0"/>
+              <a:rPr lang="en-US"/>
               <a:t>Second level</a:t>
             </a:r>
           </a:p>
           <a:p>
             <a:pPr lvl="2"/>
             <a:r>
-              <a:rPr lang="en-US" smtClean="0"/>
+              <a:rPr lang="en-US"/>
               <a:t>Third level</a:t>
             </a:r>
           </a:p>
           <a:p>
             <a:pPr lvl="3"/>
             <a:r>
-              <a:rPr lang="en-US" smtClean="0"/>
+              <a:rPr lang="en-US"/>
               <a:t>Fourth level</a:t>
             </a:r>
           </a:p>
           <a:p>
             <a:pPr lvl="4"/>
             <a:r>
-              <a:rPr lang="en-US" smtClean="0"/>
+              <a:rPr lang="en-US"/>
               <a:t>Fifth level</a:t>
             </a:r>
-            <a:endParaRPr lang="en-US"/>
           </a:p>
         </p:txBody>
       </p:sp>
@@ -487,7 +483,7 @@
           <a:p>
             <a:fld id="{241EB5C9-1307-BA42-ABA2-0BC069CD8E7F}" type="datetimeFigureOut">
               <a:rPr lang="en-US" smtClean="0"/>
-              <a:t>4/5/2019</a:t>
+              <a:t>1/2/22</a:t>
             </a:fld>
             <a:endParaRPr lang="en-US"/>
           </a:p>
@@ -577,8 +573,8 @@
         </p:nvSpPr>
         <p:spPr>
           <a:xfrm>
-            <a:off x="6629400" y="274638"/>
-            <a:ext cx="2057400" cy="5851525"/>
+            <a:off x="6629400" y="205979"/>
+            <a:ext cx="2057400" cy="4388644"/>
           </a:xfrm>
         </p:spPr>
         <p:txBody>
@@ -586,10 +582,9 @@
           <a:lstStyle/>
           <a:p>
             <a:r>
-              <a:rPr lang="en-US" smtClean="0"/>
+              <a:rPr lang="en-US"/>
               <a:t>Click to edit Master title style</a:t>
             </a:r>
-            <a:endParaRPr lang="en-US"/>
           </a:p>
         </p:txBody>
       </p:sp>
@@ -605,8 +600,8 @@
         </p:nvSpPr>
         <p:spPr>
           <a:xfrm>
-            <a:off x="457200" y="274638"/>
-            <a:ext cx="6019800" cy="5851525"/>
+            <a:off x="457200" y="205979"/>
+            <a:ext cx="6019800" cy="4388644"/>
           </a:xfrm>
         </p:spPr>
         <p:txBody>
@@ -615,38 +610,37 @@
           <a:p>
             <a:pPr lvl="0"/>
             <a:r>
-              <a:rPr lang="en-US" smtClean="0"/>
+              <a:rPr lang="en-US"/>
               <a:t>Click to edit Master text styles</a:t>
             </a:r>
           </a:p>
           <a:p>
             <a:pPr lvl="1"/>
             <a:r>
-              <a:rPr lang="en-US" smtClean="0"/>
+              <a:rPr lang="en-US"/>
               <a:t>Second level</a:t>
             </a:r>
           </a:p>
           <a:p>
             <a:pPr lvl="2"/>
             <a:r>
-              <a:rPr lang="en-US" smtClean="0"/>
+              <a:rPr lang="en-US"/>
               <a:t>Third level</a:t>
             </a:r>
           </a:p>
           <a:p>
             <a:pPr lvl="3"/>
             <a:r>
-              <a:rPr lang="en-US" smtClean="0"/>
+              <a:rPr lang="en-US"/>
               <a:t>Fourth level</a:t>
             </a:r>
           </a:p>
           <a:p>
             <a:pPr lvl="4"/>
             <a:r>
-              <a:rPr lang="en-US" smtClean="0"/>
+              <a:rPr lang="en-US"/>
               <a:t>Fifth level</a:t>
             </a:r>
-            <a:endParaRPr lang="en-US"/>
           </a:p>
         </p:txBody>
       </p:sp>
@@ -667,7 +661,7 @@
           <a:p>
             <a:fld id="{241EB5C9-1307-BA42-ABA2-0BC069CD8E7F}" type="datetimeFigureOut">
               <a:rPr lang="en-US" smtClean="0"/>
-              <a:t>4/5/2019</a:t>
+              <a:t>1/2/22</a:t>
             </a:fld>
             <a:endParaRPr lang="en-US"/>
           </a:p>
@@ -761,10 +755,9 @@
           <a:lstStyle/>
           <a:p>
             <a:r>
-              <a:rPr lang="en-US" smtClean="0"/>
+              <a:rPr lang="en-US"/>
               <a:t>Click to edit Master title style</a:t>
             </a:r>
-            <a:endParaRPr lang="en-US"/>
           </a:p>
         </p:txBody>
       </p:sp>
@@ -785,38 +778,37 @@
           <a:p>
             <a:pPr lvl="0"/>
             <a:r>
-              <a:rPr lang="en-US" smtClean="0"/>
+              <a:rPr lang="en-US"/>
               <a:t>Click to edit Master text styles</a:t>
             </a:r>
           </a:p>
           <a:p>
             <a:pPr lvl="1"/>
             <a:r>
-              <a:rPr lang="en-US" smtClean="0"/>
+              <a:rPr lang="en-US"/>
               <a:t>Second level</a:t>
             </a:r>
           </a:p>
           <a:p>
             <a:pPr lvl="2"/>
             <a:r>
-              <a:rPr lang="en-US" smtClean="0"/>
+              <a:rPr lang="en-US"/>
               <a:t>Third level</a:t>
             </a:r>
           </a:p>
           <a:p>
             <a:pPr lvl="3"/>
             <a:r>
-              <a:rPr lang="en-US" smtClean="0"/>
+              <a:rPr lang="en-US"/>
               <a:t>Fourth level</a:t>
             </a:r>
           </a:p>
           <a:p>
             <a:pPr lvl="4"/>
             <a:r>
-              <a:rPr lang="en-US" smtClean="0"/>
+              <a:rPr lang="en-US"/>
               <a:t>Fifth level</a:t>
             </a:r>
-            <a:endParaRPr lang="en-US"/>
           </a:p>
         </p:txBody>
       </p:sp>
@@ -837,7 +829,7 @@
           <a:p>
             <a:fld id="{241EB5C9-1307-BA42-ABA2-0BC069CD8E7F}" type="datetimeFigureOut">
               <a:rPr lang="en-US" smtClean="0"/>
-              <a:t>4/5/2019</a:t>
+              <a:t>1/2/22</a:t>
             </a:fld>
             <a:endParaRPr lang="en-US"/>
           </a:p>
@@ -927,23 +919,22 @@
         </p:nvSpPr>
         <p:spPr>
           <a:xfrm>
-            <a:off x="722313" y="4406900"/>
-            <a:ext cx="7772400" cy="1362075"/>
+            <a:off x="722313" y="3305176"/>
+            <a:ext cx="7772400" cy="1021556"/>
           </a:xfrm>
         </p:spPr>
         <p:txBody>
           <a:bodyPr anchor="t"/>
           <a:lstStyle>
             <a:lvl1pPr algn="l">
-              <a:defRPr sz="4000" b="1" cap="all"/>
+              <a:defRPr sz="3000" b="1" cap="all"/>
             </a:lvl1pPr>
           </a:lstStyle>
           <a:p>
             <a:r>
-              <a:rPr lang="en-US" smtClean="0"/>
+              <a:rPr lang="en-US"/>
               <a:t>Click to edit Master title style</a:t>
             </a:r>
-            <a:endParaRPr lang="en-US"/>
           </a:p>
         </p:txBody>
       </p:sp>
@@ -959,8 +950,8 @@
         </p:nvSpPr>
         <p:spPr>
           <a:xfrm>
-            <a:off x="722313" y="2906713"/>
-            <a:ext cx="7772400" cy="1500187"/>
+            <a:off x="722313" y="2180035"/>
+            <a:ext cx="7772400" cy="1125140"/>
           </a:xfrm>
         </p:spPr>
         <p:txBody>
@@ -968,7 +959,7 @@
           <a:lstStyle>
             <a:lvl1pPr marL="0" indent="0">
               <a:buNone/>
-              <a:defRPr sz="2000">
+              <a:defRPr sz="1500">
                 <a:solidFill>
                   <a:schemeClr val="tx1">
                     <a:tint val="75000"/>
@@ -976,9 +967,9 @@
                 </a:solidFill>
               </a:defRPr>
             </a:lvl1pPr>
-            <a:lvl2pPr marL="457200" indent="0">
-              <a:buNone/>
-              <a:defRPr sz="1800">
+            <a:lvl2pPr marL="342900" indent="0">
+              <a:buNone/>
+              <a:defRPr sz="1350">
                 <a:solidFill>
                   <a:schemeClr val="tx1">
                     <a:tint val="75000"/>
@@ -986,9 +977,9 @@
                 </a:solidFill>
               </a:defRPr>
             </a:lvl2pPr>
-            <a:lvl3pPr marL="914400" indent="0">
-              <a:buNone/>
-              <a:defRPr sz="1600">
+            <a:lvl3pPr marL="685800" indent="0">
+              <a:buNone/>
+              <a:defRPr sz="1200">
                 <a:solidFill>
                   <a:schemeClr val="tx1">
                     <a:tint val="75000"/>
@@ -996,9 +987,9 @@
                 </a:solidFill>
               </a:defRPr>
             </a:lvl3pPr>
-            <a:lvl4pPr marL="1371600" indent="0">
-              <a:buNone/>
-              <a:defRPr sz="1400">
+            <a:lvl4pPr marL="1028700" indent="0">
+              <a:buNone/>
+              <a:defRPr sz="1050">
                 <a:solidFill>
                   <a:schemeClr val="tx1">
                     <a:tint val="75000"/>
@@ -1006,9 +997,9 @@
                 </a:solidFill>
               </a:defRPr>
             </a:lvl4pPr>
-            <a:lvl5pPr marL="1828800" indent="0">
-              <a:buNone/>
-              <a:defRPr sz="1400">
+            <a:lvl5pPr marL="1371600" indent="0">
+              <a:buNone/>
+              <a:defRPr sz="1050">
                 <a:solidFill>
                   <a:schemeClr val="tx1">
                     <a:tint val="75000"/>
@@ -1016,9 +1007,9 @@
                 </a:solidFill>
               </a:defRPr>
             </a:lvl5pPr>
-            <a:lvl6pPr marL="2286000" indent="0">
-              <a:buNone/>
-              <a:defRPr sz="1400">
+            <a:lvl6pPr marL="1714500" indent="0">
+              <a:buNone/>
+              <a:defRPr sz="1050">
                 <a:solidFill>
                   <a:schemeClr val="tx1">
                     <a:tint val="75000"/>
@@ -1026,9 +1017,9 @@
                 </a:solidFill>
               </a:defRPr>
             </a:lvl6pPr>
-            <a:lvl7pPr marL="2743200" indent="0">
-              <a:buNone/>
-              <a:defRPr sz="1400">
+            <a:lvl7pPr marL="2057400" indent="0">
+              <a:buNone/>
+              <a:defRPr sz="1050">
                 <a:solidFill>
                   <a:schemeClr val="tx1">
                     <a:tint val="75000"/>
@@ -1036,9 +1027,9 @@
                 </a:solidFill>
               </a:defRPr>
             </a:lvl7pPr>
-            <a:lvl8pPr marL="3200400" indent="0">
-              <a:buNone/>
-              <a:defRPr sz="1400">
+            <a:lvl8pPr marL="2400300" indent="0">
+              <a:buNone/>
+              <a:defRPr sz="1050">
                 <a:solidFill>
                   <a:schemeClr val="tx1">
                     <a:tint val="75000"/>
@@ -1046,9 +1037,9 @@
                 </a:solidFill>
               </a:defRPr>
             </a:lvl8pPr>
-            <a:lvl9pPr marL="3657600" indent="0">
-              <a:buNone/>
-              <a:defRPr sz="1400">
+            <a:lvl9pPr marL="2743200" indent="0">
+              <a:buNone/>
+              <a:defRPr sz="1050">
                 <a:solidFill>
                   <a:schemeClr val="tx1">
                     <a:tint val="75000"/>
@@ -1060,7 +1051,7 @@
           <a:p>
             <a:pPr lvl="0"/>
             <a:r>
-              <a:rPr lang="en-US" smtClean="0"/>
+              <a:rPr lang="en-US"/>
               <a:t>Click to edit Master text styles</a:t>
             </a:r>
           </a:p>
@@ -1083,7 +1074,7 @@
           <a:p>
             <a:fld id="{241EB5C9-1307-BA42-ABA2-0BC069CD8E7F}" type="datetimeFigureOut">
               <a:rPr lang="en-US" smtClean="0"/>
-              <a:t>4/5/2019</a:t>
+              <a:t>1/2/22</a:t>
             </a:fld>
             <a:endParaRPr lang="en-US"/>
           </a:p>
@@ -1177,10 +1168,9 @@
           <a:lstStyle/>
           <a:p>
             <a:r>
-              <a:rPr lang="en-US" smtClean="0"/>
+              <a:rPr lang="en-US"/>
               <a:t>Click to edit Master title style</a:t>
             </a:r>
-            <a:endParaRPr lang="en-US"/>
           </a:p>
         </p:txBody>
       </p:sp>
@@ -1196,76 +1186,75 @@
         </p:nvSpPr>
         <p:spPr>
           <a:xfrm>
-            <a:off x="457200" y="1600200"/>
-            <a:ext cx="4038600" cy="4525963"/>
+            <a:off x="457200" y="1200151"/>
+            <a:ext cx="4038600" cy="3394472"/>
           </a:xfrm>
         </p:spPr>
         <p:txBody>
           <a:bodyPr/>
           <a:lstStyle>
             <a:lvl1pPr>
-              <a:defRPr sz="2800"/>
+              <a:defRPr sz="2100"/>
             </a:lvl1pPr>
             <a:lvl2pPr>
-              <a:defRPr sz="2400"/>
+              <a:defRPr sz="1800"/>
             </a:lvl2pPr>
             <a:lvl3pPr>
-              <a:defRPr sz="2000"/>
+              <a:defRPr sz="1500"/>
             </a:lvl3pPr>
             <a:lvl4pPr>
-              <a:defRPr sz="1800"/>
+              <a:defRPr sz="1350"/>
             </a:lvl4pPr>
             <a:lvl5pPr>
-              <a:defRPr sz="1800"/>
+              <a:defRPr sz="1350"/>
             </a:lvl5pPr>
             <a:lvl6pPr>
-              <a:defRPr sz="1800"/>
+              <a:defRPr sz="1350"/>
             </a:lvl6pPr>
             <a:lvl7pPr>
-              <a:defRPr sz="1800"/>
+              <a:defRPr sz="1350"/>
             </a:lvl7pPr>
             <a:lvl8pPr>
-              <a:defRPr sz="1800"/>
+              <a:defRPr sz="1350"/>
             </a:lvl8pPr>
             <a:lvl9pPr>
-              <a:defRPr sz="1800"/>
+              <a:defRPr sz="1350"/>
             </a:lvl9pPr>
           </a:lstStyle>
           <a:p>
             <a:pPr lvl="0"/>
             <a:r>
-              <a:rPr lang="en-US" smtClean="0"/>
+              <a:rPr lang="en-US"/>
               <a:t>Click to edit Master text styles</a:t>
             </a:r>
           </a:p>
           <a:p>
             <a:pPr lvl="1"/>
             <a:r>
-              <a:rPr lang="en-US" smtClean="0"/>
+              <a:rPr lang="en-US"/>
               <a:t>Second level</a:t>
             </a:r>
           </a:p>
           <a:p>
             <a:pPr lvl="2"/>
             <a:r>
-              <a:rPr lang="en-US" smtClean="0"/>
+              <a:rPr lang="en-US"/>
               <a:t>Third level</a:t>
             </a:r>
           </a:p>
           <a:p>
             <a:pPr lvl="3"/>
             <a:r>
-              <a:rPr lang="en-US" smtClean="0"/>
+              <a:rPr lang="en-US"/>
               <a:t>Fourth level</a:t>
             </a:r>
           </a:p>
           <a:p>
             <a:pPr lvl="4"/>
             <a:r>
-              <a:rPr lang="en-US" smtClean="0"/>
+              <a:rPr lang="en-US"/>
               <a:t>Fifth level</a:t>
             </a:r>
-            <a:endParaRPr lang="en-US"/>
           </a:p>
         </p:txBody>
       </p:sp>
@@ -1281,76 +1270,75 @@
         </p:nvSpPr>
         <p:spPr>
           <a:xfrm>
-            <a:off x="4648200" y="1600200"/>
-            <a:ext cx="4038600" cy="4525963"/>
+            <a:off x="4648200" y="1200151"/>
+            <a:ext cx="4038600" cy="3394472"/>
           </a:xfrm>
         </p:spPr>
         <p:txBody>
           <a:bodyPr/>
           <a:lstStyle>
             <a:lvl1pPr>
-              <a:defRPr sz="2800"/>
+              <a:defRPr sz="2100"/>
             </a:lvl1pPr>
             <a:lvl2pPr>
-              <a:defRPr sz="2400"/>
+              <a:defRPr sz="1800"/>
             </a:lvl2pPr>
             <a:lvl3pPr>
-              <a:defRPr sz="2000"/>
+              <a:defRPr sz="1500"/>
             </a:lvl3pPr>
             <a:lvl4pPr>
-              <a:defRPr sz="1800"/>
+              <a:defRPr sz="1350"/>
             </a:lvl4pPr>
             <a:lvl5pPr>
-              <a:defRPr sz="1800"/>
+              <a:defRPr sz="1350"/>
             </a:lvl5pPr>
             <a:lvl6pPr>
-              <a:defRPr sz="1800"/>
+              <a:defRPr sz="1350"/>
             </a:lvl6pPr>
             <a:lvl7pPr>
-              <a:defRPr sz="1800"/>
+              <a:defRPr sz="1350"/>
             </a:lvl7pPr>
             <a:lvl8pPr>
-              <a:defRPr sz="1800"/>
+              <a:defRPr sz="1350"/>
             </a:lvl8pPr>
             <a:lvl9pPr>
-              <a:defRPr sz="1800"/>
+              <a:defRPr sz="1350"/>
             </a:lvl9pPr>
           </a:lstStyle>
           <a:p>
             <a:pPr lvl="0"/>
             <a:r>
-              <a:rPr lang="en-US" smtClean="0"/>
+              <a:rPr lang="en-US"/>
               <a:t>Click to edit Master text styles</a:t>
             </a:r>
           </a:p>
           <a:p>
             <a:pPr lvl="1"/>
             <a:r>
-              <a:rPr lang="en-US" smtClean="0"/>
+              <a:rPr lang="en-US"/>
               <a:t>Second level</a:t>
             </a:r>
           </a:p>
           <a:p>
             <a:pPr lvl="2"/>
             <a:r>
-              <a:rPr lang="en-US" smtClean="0"/>
+              <a:rPr lang="en-US"/>
               <a:t>Third level</a:t>
             </a:r>
           </a:p>
           <a:p>
             <a:pPr lvl="3"/>
             <a:r>
-              <a:rPr lang="en-US" smtClean="0"/>
+              <a:rPr lang="en-US"/>
               <a:t>Fourth level</a:t>
             </a:r>
           </a:p>
           <a:p>
             <a:pPr lvl="4"/>
             <a:r>
-              <a:rPr lang="en-US" smtClean="0"/>
+              <a:rPr lang="en-US"/>
               <a:t>Fifth level</a:t>
             </a:r>
-            <a:endParaRPr lang="en-US"/>
           </a:p>
         </p:txBody>
       </p:sp>
@@ -1371,7 +1359,7 @@
           <a:p>
             <a:fld id="{241EB5C9-1307-BA42-ABA2-0BC069CD8E7F}" type="datetimeFigureOut">
               <a:rPr lang="en-US" smtClean="0"/>
-              <a:t>4/5/2019</a:t>
+              <a:t>1/2/22</a:t>
             </a:fld>
             <a:endParaRPr lang="en-US"/>
           </a:p>
@@ -1469,10 +1457,9 @@
           </a:lstStyle>
           <a:p>
             <a:r>
-              <a:rPr lang="en-US" smtClean="0"/>
+              <a:rPr lang="en-US"/>
               <a:t>Click to edit Master title style</a:t>
             </a:r>
-            <a:endParaRPr lang="en-US"/>
           </a:p>
         </p:txBody>
       </p:sp>
@@ -1488,8 +1475,8 @@
         </p:nvSpPr>
         <p:spPr>
           <a:xfrm>
-            <a:off x="457200" y="1535113"/>
-            <a:ext cx="4040188" cy="639762"/>
+            <a:off x="457200" y="1151335"/>
+            <a:ext cx="4040188" cy="479822"/>
           </a:xfrm>
         </p:spPr>
         <p:txBody>
@@ -1497,45 +1484,45 @@
           <a:lstStyle>
             <a:lvl1pPr marL="0" indent="0">
               <a:buNone/>
-              <a:defRPr sz="2400" b="1"/>
+              <a:defRPr sz="1800" b="1"/>
             </a:lvl1pPr>
-            <a:lvl2pPr marL="457200" indent="0">
-              <a:buNone/>
-              <a:defRPr sz="2000" b="1"/>
+            <a:lvl2pPr marL="342900" indent="0">
+              <a:buNone/>
+              <a:defRPr sz="1500" b="1"/>
             </a:lvl2pPr>
-            <a:lvl3pPr marL="914400" indent="0">
-              <a:buNone/>
-              <a:defRPr sz="1800" b="1"/>
+            <a:lvl3pPr marL="685800" indent="0">
+              <a:buNone/>
+              <a:defRPr sz="1350" b="1"/>
             </a:lvl3pPr>
-            <a:lvl4pPr marL="1371600" indent="0">
-              <a:buNone/>
-              <a:defRPr sz="1600" b="1"/>
+            <a:lvl4pPr marL="1028700" indent="0">
+              <a:buNone/>
+              <a:defRPr sz="1200" b="1"/>
             </a:lvl4pPr>
-            <a:lvl5pPr marL="1828800" indent="0">
-              <a:buNone/>
-              <a:defRPr sz="1600" b="1"/>
+            <a:lvl5pPr marL="1371600" indent="0">
+              <a:buNone/>
+              <a:defRPr sz="1200" b="1"/>
             </a:lvl5pPr>
-            <a:lvl6pPr marL="2286000" indent="0">
-              <a:buNone/>
-              <a:defRPr sz="1600" b="1"/>
+            <a:lvl6pPr marL="1714500" indent="0">
+              <a:buNone/>
+              <a:defRPr sz="1200" b="1"/>
             </a:lvl6pPr>
-            <a:lvl7pPr marL="2743200" indent="0">
-              <a:buNone/>
-              <a:defRPr sz="1600" b="1"/>
+            <a:lvl7pPr marL="2057400" indent="0">
+              <a:buNone/>
+              <a:defRPr sz="1200" b="1"/>
             </a:lvl7pPr>
-            <a:lvl8pPr marL="3200400" indent="0">
-              <a:buNone/>
-              <a:defRPr sz="1600" b="1"/>
+            <a:lvl8pPr marL="2400300" indent="0">
+              <a:buNone/>
+              <a:defRPr sz="1200" b="1"/>
             </a:lvl8pPr>
-            <a:lvl9pPr marL="3657600" indent="0">
-              <a:buNone/>
-              <a:defRPr sz="1600" b="1"/>
+            <a:lvl9pPr marL="2743200" indent="0">
+              <a:buNone/>
+              <a:defRPr sz="1200" b="1"/>
             </a:lvl9pPr>
           </a:lstStyle>
           <a:p>
             <a:pPr lvl="0"/>
             <a:r>
-              <a:rPr lang="en-US" smtClean="0"/>
+              <a:rPr lang="en-US"/>
               <a:t>Click to edit Master text styles</a:t>
             </a:r>
           </a:p>
@@ -1553,76 +1540,75 @@
         </p:nvSpPr>
         <p:spPr>
           <a:xfrm>
-            <a:off x="457200" y="2174875"/>
-            <a:ext cx="4040188" cy="3951288"/>
+            <a:off x="457200" y="1631156"/>
+            <a:ext cx="4040188" cy="2963466"/>
           </a:xfrm>
         </p:spPr>
         <p:txBody>
           <a:bodyPr/>
           <a:lstStyle>
             <a:lvl1pPr>
-              <a:defRPr sz="2400"/>
+              <a:defRPr sz="1800"/>
             </a:lvl1pPr>
             <a:lvl2pPr>
-              <a:defRPr sz="2000"/>
+              <a:defRPr sz="1500"/>
             </a:lvl2pPr>
             <a:lvl3pPr>
-              <a:defRPr sz="1800"/>
+              <a:defRPr sz="1350"/>
             </a:lvl3pPr>
             <a:lvl4pPr>
-              <a:defRPr sz="1600"/>
+              <a:defRPr sz="1200"/>
             </a:lvl4pPr>
             <a:lvl5pPr>
-              <a:defRPr sz="1600"/>
+              <a:defRPr sz="1200"/>
             </a:lvl5pPr>
             <a:lvl6pPr>
-              <a:defRPr sz="1600"/>
+              <a:defRPr sz="1200"/>
             </a:lvl6pPr>
             <a:lvl7pPr>
-              <a:defRPr sz="1600"/>
+              <a:defRPr sz="1200"/>
             </a:lvl7pPr>
             <a:lvl8pPr>
-              <a:defRPr sz="1600"/>
+              <a:defRPr sz="1200"/>
             </a:lvl8pPr>
             <a:lvl9pPr>
-              <a:defRPr sz="1600"/>
+              <a:defRPr sz="1200"/>
             </a:lvl9pPr>
           </a:lstStyle>
           <a:p>
             <a:pPr lvl="0"/>
             <a:r>
-              <a:rPr lang="en-US" smtClean="0"/>
+              <a:rPr lang="en-US"/>
               <a:t>Click to edit Master text styles</a:t>
             </a:r>
           </a:p>
           <a:p>
             <a:pPr lvl="1"/>
             <a:r>
-              <a:rPr lang="en-US" smtClean="0"/>
+              <a:rPr lang="en-US"/>
               <a:t>Second level</a:t>
             </a:r>
           </a:p>
           <a:p>
             <a:pPr lvl="2"/>
             <a:r>
-              <a:rPr lang="en-US" smtClean="0"/>
+              <a:rPr lang="en-US"/>
               <a:t>Third level</a:t>
             </a:r>
           </a:p>
           <a:p>
             <a:pPr lvl="3"/>
             <a:r>
-              <a:rPr lang="en-US" smtClean="0"/>
+              <a:rPr lang="en-US"/>
               <a:t>Fourth level</a:t>
             </a:r>
           </a:p>
           <a:p>
             <a:pPr lvl="4"/>
             <a:r>
-              <a:rPr lang="en-US" smtClean="0"/>
+              <a:rPr lang="en-US"/>
               <a:t>Fifth level</a:t>
             </a:r>
-            <a:endParaRPr lang="en-US"/>
           </a:p>
         </p:txBody>
       </p:sp>
@@ -1638,8 +1624,8 @@
         </p:nvSpPr>
         <p:spPr>
           <a:xfrm>
-            <a:off x="4645025" y="1535113"/>
-            <a:ext cx="4041775" cy="639762"/>
+            <a:off x="4645026" y="1151335"/>
+            <a:ext cx="4041775" cy="479822"/>
           </a:xfrm>
         </p:spPr>
         <p:txBody>
@@ -1647,45 +1633,45 @@
           <a:lstStyle>
             <a:lvl1pPr marL="0" indent="0">
               <a:buNone/>
-              <a:defRPr sz="2400" b="1"/>
+              <a:defRPr sz="1800" b="1"/>
             </a:lvl1pPr>
-            <a:lvl2pPr marL="457200" indent="0">
-              <a:buNone/>
-              <a:defRPr sz="2000" b="1"/>
+            <a:lvl2pPr marL="342900" indent="0">
+              <a:buNone/>
+              <a:defRPr sz="1500" b="1"/>
             </a:lvl2pPr>
-            <a:lvl3pPr marL="914400" indent="0">
-              <a:buNone/>
-              <a:defRPr sz="1800" b="1"/>
+            <a:lvl3pPr marL="685800" indent="0">
+              <a:buNone/>
+              <a:defRPr sz="1350" b="1"/>
             </a:lvl3pPr>
-            <a:lvl4pPr marL="1371600" indent="0">
-              <a:buNone/>
-              <a:defRPr sz="1600" b="1"/>
+            <a:lvl4pPr marL="1028700" indent="0">
+              <a:buNone/>
+              <a:defRPr sz="1200" b="1"/>
             </a:lvl4pPr>
-            <a:lvl5pPr marL="1828800" indent="0">
-              <a:buNone/>
-              <a:defRPr sz="1600" b="1"/>
+            <a:lvl5pPr marL="1371600" indent="0">
+              <a:buNone/>
+              <a:defRPr sz="1200" b="1"/>
             </a:lvl5pPr>
-            <a:lvl6pPr marL="2286000" indent="0">
-              <a:buNone/>
-              <a:defRPr sz="1600" b="1"/>
+            <a:lvl6pPr marL="1714500" indent="0">
+              <a:buNone/>
+              <a:defRPr sz="1200" b="1"/>
             </a:lvl6pPr>
-            <a:lvl7pPr marL="2743200" indent="0">
-              <a:buNone/>
-              <a:defRPr sz="1600" b="1"/>
+            <a:lvl7pPr marL="2057400" indent="0">
+              <a:buNone/>
+              <a:defRPr sz="1200" b="1"/>
             </a:lvl7pPr>
-            <a:lvl8pPr marL="3200400" indent="0">
-              <a:buNone/>
-              <a:defRPr sz="1600" b="1"/>
+            <a:lvl8pPr marL="2400300" indent="0">
+              <a:buNone/>
+              <a:defRPr sz="1200" b="1"/>
             </a:lvl8pPr>
-            <a:lvl9pPr marL="3657600" indent="0">
-              <a:buNone/>
-              <a:defRPr sz="1600" b="1"/>
+            <a:lvl9pPr marL="2743200" indent="0">
+              <a:buNone/>
+              <a:defRPr sz="1200" b="1"/>
             </a:lvl9pPr>
           </a:lstStyle>
           <a:p>
             <a:pPr lvl="0"/>
             <a:r>
-              <a:rPr lang="en-US" smtClean="0"/>
+              <a:rPr lang="en-US"/>
               <a:t>Click to edit Master text styles</a:t>
             </a:r>
           </a:p>
@@ -1703,76 +1689,75 @@
         </p:nvSpPr>
         <p:spPr>
           <a:xfrm>
-            <a:off x="4645025" y="2174875"/>
-            <a:ext cx="4041775" cy="3951288"/>
+            <a:off x="4645026" y="1631156"/>
+            <a:ext cx="4041775" cy="2963466"/>
           </a:xfrm>
         </p:spPr>
         <p:txBody>
           <a:bodyPr/>
           <a:lstStyle>
             <a:lvl1pPr>
-              <a:defRPr sz="2400"/>
+              <a:defRPr sz="1800"/>
             </a:lvl1pPr>
             <a:lvl2pPr>
-              <a:defRPr sz="2000"/>
+              <a:defRPr sz="1500"/>
             </a:lvl2pPr>
             <a:lvl3pPr>
-              <a:defRPr sz="1800"/>
+              <a:defRPr sz="1350"/>
             </a:lvl3pPr>
             <a:lvl4pPr>
-              <a:defRPr sz="1600"/>
+              <a:defRPr sz="1200"/>
             </a:lvl4pPr>
             <a:lvl5pPr>
-              <a:defRPr sz="1600"/>
+              <a:defRPr sz="1200"/>
             </a:lvl5pPr>
             <a:lvl6pPr>
-              <a:defRPr sz="1600"/>
+              <a:defRPr sz="1200"/>
             </a:lvl6pPr>
             <a:lvl7pPr>
-              <a:defRPr sz="1600"/>
+              <a:defRPr sz="1200"/>
             </a:lvl7pPr>
             <a:lvl8pPr>
-              <a:defRPr sz="1600"/>
+              <a:defRPr sz="1200"/>
             </a:lvl8pPr>
             <a:lvl9pPr>
-              <a:defRPr sz="1600"/>
+              <a:defRPr sz="1200"/>
             </a:lvl9pPr>
           </a:lstStyle>
           <a:p>
             <a:pPr lvl="0"/>
             <a:r>
-              <a:rPr lang="en-US" smtClean="0"/>
+              <a:rPr lang="en-US"/>
               <a:t>Click to edit Master text styles</a:t>
             </a:r>
           </a:p>
           <a:p>
             <a:pPr lvl="1"/>
             <a:r>
-              <a:rPr lang="en-US" smtClean="0"/>
+              <a:rPr lang="en-US"/>
               <a:t>Second level</a:t>
             </a:r>
           </a:p>
           <a:p>
             <a:pPr lvl="2"/>
             <a:r>
-              <a:rPr lang="en-US" smtClean="0"/>
+              <a:rPr lang="en-US"/>
               <a:t>Third level</a:t>
             </a:r>
           </a:p>
           <a:p>
             <a:pPr lvl="3"/>
             <a:r>
-              <a:rPr lang="en-US" smtClean="0"/>
+              <a:rPr lang="en-US"/>
               <a:t>Fourth level</a:t>
             </a:r>
           </a:p>
           <a:p>
             <a:pPr lvl="4"/>
             <a:r>
-              <a:rPr lang="en-US" smtClean="0"/>
+              <a:rPr lang="en-US"/>
               <a:t>Fifth level</a:t>
             </a:r>
-            <a:endParaRPr lang="en-US"/>
           </a:p>
         </p:txBody>
       </p:sp>
@@ -1793,7 +1778,7 @@
           <a:p>
             <a:fld id="{241EB5C9-1307-BA42-ABA2-0BC069CD8E7F}" type="datetimeFigureOut">
               <a:rPr lang="en-US" smtClean="0"/>
-              <a:t>4/5/2019</a:t>
+              <a:t>1/2/22</a:t>
             </a:fld>
             <a:endParaRPr lang="en-US"/>
           </a:p>
@@ -1887,10 +1872,9 @@
           <a:lstStyle/>
           <a:p>
             <a:r>
-              <a:rPr lang="en-US" smtClean="0"/>
+              <a:rPr lang="en-US"/>
               <a:t>Click to edit Master title style</a:t>
             </a:r>
-            <a:endParaRPr lang="en-US"/>
           </a:p>
         </p:txBody>
       </p:sp>
@@ -1911,7 +1895,7 @@
           <a:p>
             <a:fld id="{241EB5C9-1307-BA42-ABA2-0BC069CD8E7F}" type="datetimeFigureOut">
               <a:rPr lang="en-US" smtClean="0"/>
-              <a:t>4/5/2019</a:t>
+              <a:t>1/2/22</a:t>
             </a:fld>
             <a:endParaRPr lang="en-US"/>
           </a:p>
@@ -2006,7 +1990,7 @@
           <a:p>
             <a:fld id="{241EB5C9-1307-BA42-ABA2-0BC069CD8E7F}" type="datetimeFigureOut">
               <a:rPr lang="en-US" smtClean="0"/>
-              <a:t>4/5/2019</a:t>
+              <a:t>1/2/22</a:t>
             </a:fld>
             <a:endParaRPr lang="en-US"/>
           </a:p>
@@ -2096,23 +2080,22 @@
         </p:nvSpPr>
         <p:spPr>
           <a:xfrm>
-            <a:off x="457200" y="273050"/>
-            <a:ext cx="3008313" cy="1162050"/>
+            <a:off x="457201" y="204787"/>
+            <a:ext cx="3008313" cy="871538"/>
           </a:xfrm>
         </p:spPr>
         <p:txBody>
           <a:bodyPr anchor="b"/>
           <a:lstStyle>
             <a:lvl1pPr algn="l">
-              <a:defRPr sz="2000" b="1"/>
+              <a:defRPr sz="1500" b="1"/>
             </a:lvl1pPr>
           </a:lstStyle>
           <a:p>
             <a:r>
-              <a:rPr lang="en-US" smtClean="0"/>
+              <a:rPr lang="en-US"/>
               <a:t>Click to edit Master title style</a:t>
             </a:r>
-            <a:endParaRPr lang="en-US"/>
           </a:p>
         </p:txBody>
       </p:sp>
@@ -2128,76 +2111,75 @@
         </p:nvSpPr>
         <p:spPr>
           <a:xfrm>
-            <a:off x="3575050" y="273050"/>
-            <a:ext cx="5111750" cy="5853113"/>
+            <a:off x="3575050" y="204788"/>
+            <a:ext cx="5111750" cy="4389835"/>
           </a:xfrm>
         </p:spPr>
         <p:txBody>
           <a:bodyPr/>
           <a:lstStyle>
             <a:lvl1pPr>
-              <a:defRPr sz="3200"/>
+              <a:defRPr sz="2400"/>
             </a:lvl1pPr>
             <a:lvl2pPr>
-              <a:defRPr sz="2800"/>
+              <a:defRPr sz="2100"/>
             </a:lvl2pPr>
             <a:lvl3pPr>
-              <a:defRPr sz="2400"/>
+              <a:defRPr sz="1800"/>
             </a:lvl3pPr>
             <a:lvl4pPr>
-              <a:defRPr sz="2000"/>
+              <a:defRPr sz="1500"/>
             </a:lvl4pPr>
             <a:lvl5pPr>
-              <a:defRPr sz="2000"/>
+              <a:defRPr sz="1500"/>
             </a:lvl5pPr>
             <a:lvl6pPr>
-              <a:defRPr sz="2000"/>
+              <a:defRPr sz="1500"/>
             </a:lvl6pPr>
             <a:lvl7pPr>
-              <a:defRPr sz="2000"/>
+              <a:defRPr sz="1500"/>
             </a:lvl7pPr>
             <a:lvl8pPr>
-              <a:defRPr sz="2000"/>
+              <a:defRPr sz="1500"/>
             </a:lvl8pPr>
             <a:lvl9pPr>
-              <a:defRPr sz="2000"/>
+              <a:defRPr sz="1500"/>
             </a:lvl9pPr>
           </a:lstStyle>
           <a:p>
             <a:pPr lvl="0"/>
             <a:r>
-              <a:rPr lang="en-US" smtClean="0"/>
+              <a:rPr lang="en-US"/>
               <a:t>Click to edit Master text styles</a:t>
             </a:r>
           </a:p>
           <a:p>
             <a:pPr lvl="1"/>
             <a:r>
-              <a:rPr lang="en-US" smtClean="0"/>
+              <a:rPr lang="en-US"/>
               <a:t>Second level</a:t>
             </a:r>
           </a:p>
           <a:p>
             <a:pPr lvl="2"/>
             <a:r>
-              <a:rPr lang="en-US" smtClean="0"/>
+              <a:rPr lang="en-US"/>
               <a:t>Third level</a:t>
             </a:r>
           </a:p>
           <a:p>
             <a:pPr lvl="3"/>
             <a:r>
-              <a:rPr lang="en-US" smtClean="0"/>
+              <a:rPr lang="en-US"/>
               <a:t>Fourth level</a:t>
             </a:r>
           </a:p>
           <a:p>
             <a:pPr lvl="4"/>
             <a:r>
-              <a:rPr lang="en-US" smtClean="0"/>
+              <a:rPr lang="en-US"/>
               <a:t>Fifth level</a:t>
             </a:r>
-            <a:endParaRPr lang="en-US"/>
           </a:p>
         </p:txBody>
       </p:sp>
@@ -2213,8 +2195,8 @@
         </p:nvSpPr>
         <p:spPr>
           <a:xfrm>
-            <a:off x="457200" y="1435100"/>
-            <a:ext cx="3008313" cy="4691063"/>
+            <a:off x="457201" y="1076326"/>
+            <a:ext cx="3008313" cy="3518297"/>
           </a:xfrm>
         </p:spPr>
         <p:txBody>
@@ -2222,45 +2204,45 @@
           <a:lstStyle>
             <a:lvl1pPr marL="0" indent="0">
               <a:buNone/>
-              <a:defRPr sz="1400"/>
+              <a:defRPr sz="1050"/>
             </a:lvl1pPr>
-            <a:lvl2pPr marL="457200" indent="0">
-              <a:buNone/>
-              <a:defRPr sz="1200"/>
+            <a:lvl2pPr marL="342900" indent="0">
+              <a:buNone/>
+              <a:defRPr sz="900"/>
             </a:lvl2pPr>
-            <a:lvl3pPr marL="914400" indent="0">
-              <a:buNone/>
-              <a:defRPr sz="1000"/>
+            <a:lvl3pPr marL="685800" indent="0">
+              <a:buNone/>
+              <a:defRPr sz="750"/>
             </a:lvl3pPr>
-            <a:lvl4pPr marL="1371600" indent="0">
-              <a:buNone/>
-              <a:defRPr sz="900"/>
+            <a:lvl4pPr marL="1028700" indent="0">
+              <a:buNone/>
+              <a:defRPr sz="675"/>
             </a:lvl4pPr>
-            <a:lvl5pPr marL="1828800" indent="0">
-              <a:buNone/>
-              <a:defRPr sz="900"/>
+            <a:lvl5pPr marL="1371600" indent="0">
+              <a:buNone/>
+              <a:defRPr sz="675"/>
             </a:lvl5pPr>
-            <a:lvl6pPr marL="2286000" indent="0">
-              <a:buNone/>
-              <a:defRPr sz="900"/>
+            <a:lvl6pPr marL="1714500" indent="0">
+              <a:buNone/>
+              <a:defRPr sz="675"/>
             </a:lvl6pPr>
-            <a:lvl7pPr marL="2743200" indent="0">
-              <a:buNone/>
-              <a:defRPr sz="900"/>
+            <a:lvl7pPr marL="2057400" indent="0">
+              <a:buNone/>
+              <a:defRPr sz="675"/>
             </a:lvl7pPr>
-            <a:lvl8pPr marL="3200400" indent="0">
-              <a:buNone/>
-              <a:defRPr sz="900"/>
+            <a:lvl8pPr marL="2400300" indent="0">
+              <a:buNone/>
+              <a:defRPr sz="675"/>
             </a:lvl8pPr>
-            <a:lvl9pPr marL="3657600" indent="0">
-              <a:buNone/>
-              <a:defRPr sz="900"/>
+            <a:lvl9pPr marL="2743200" indent="0">
+              <a:buNone/>
+              <a:defRPr sz="675"/>
             </a:lvl9pPr>
           </a:lstStyle>
           <a:p>
             <a:pPr lvl="0"/>
             <a:r>
-              <a:rPr lang="en-US" smtClean="0"/>
+              <a:rPr lang="en-US"/>
               <a:t>Click to edit Master text styles</a:t>
             </a:r>
           </a:p>
@@ -2283,7 +2265,7 @@
           <a:p>
             <a:fld id="{241EB5C9-1307-BA42-ABA2-0BC069CD8E7F}" type="datetimeFigureOut">
               <a:rPr lang="en-US" smtClean="0"/>
-              <a:t>4/5/2019</a:t>
+              <a:t>1/2/22</a:t>
             </a:fld>
             <a:endParaRPr lang="en-US"/>
           </a:p>
@@ -2373,23 +2355,22 @@
         </p:nvSpPr>
         <p:spPr>
           <a:xfrm>
-            <a:off x="1792288" y="4800600"/>
-            <a:ext cx="5486400" cy="566738"/>
+            <a:off x="1792288" y="3600450"/>
+            <a:ext cx="5486400" cy="425054"/>
           </a:xfrm>
         </p:spPr>
         <p:txBody>
           <a:bodyPr anchor="b"/>
           <a:lstStyle>
             <a:lvl1pPr algn="l">
-              <a:defRPr sz="2000" b="1"/>
+              <a:defRPr sz="1500" b="1"/>
             </a:lvl1pPr>
           </a:lstStyle>
           <a:p>
             <a:r>
-              <a:rPr lang="en-US" smtClean="0"/>
+              <a:rPr lang="en-US"/>
               <a:t>Click to edit Master title style</a:t>
             </a:r>
-            <a:endParaRPr lang="en-US"/>
           </a:p>
         </p:txBody>
       </p:sp>
@@ -2405,8 +2386,8 @@
         </p:nvSpPr>
         <p:spPr>
           <a:xfrm>
-            <a:off x="1792288" y="612775"/>
-            <a:ext cx="5486400" cy="4114800"/>
+            <a:off x="1792288" y="459581"/>
+            <a:ext cx="5486400" cy="3086100"/>
           </a:xfrm>
         </p:spPr>
         <p:txBody>
@@ -2414,39 +2395,39 @@
           <a:lstStyle>
             <a:lvl1pPr marL="0" indent="0">
               <a:buNone/>
-              <a:defRPr sz="3200"/>
+              <a:defRPr sz="2400"/>
             </a:lvl1pPr>
-            <a:lvl2pPr marL="457200" indent="0">
-              <a:buNone/>
-              <a:defRPr sz="2800"/>
+            <a:lvl2pPr marL="342900" indent="0">
+              <a:buNone/>
+              <a:defRPr sz="2100"/>
             </a:lvl2pPr>
-            <a:lvl3pPr marL="914400" indent="0">
-              <a:buNone/>
-              <a:defRPr sz="2400"/>
+            <a:lvl3pPr marL="685800" indent="0">
+              <a:buNone/>
+              <a:defRPr sz="1800"/>
             </a:lvl3pPr>
-            <a:lvl4pPr marL="1371600" indent="0">
-              <a:buNone/>
-              <a:defRPr sz="2000"/>
+            <a:lvl4pPr marL="1028700" indent="0">
+              <a:buNone/>
+              <a:defRPr sz="1500"/>
             </a:lvl4pPr>
-            <a:lvl5pPr marL="1828800" indent="0">
-              <a:buNone/>
-              <a:defRPr sz="2000"/>
+            <a:lvl5pPr marL="1371600" indent="0">
+              <a:buNone/>
+              <a:defRPr sz="1500"/>
             </a:lvl5pPr>
-            <a:lvl6pPr marL="2286000" indent="0">
-              <a:buNone/>
-              <a:defRPr sz="2000"/>
+            <a:lvl6pPr marL="1714500" indent="0">
+              <a:buNone/>
+              <a:defRPr sz="1500"/>
             </a:lvl6pPr>
-            <a:lvl7pPr marL="2743200" indent="0">
-              <a:buNone/>
-              <a:defRPr sz="2000"/>
+            <a:lvl7pPr marL="2057400" indent="0">
+              <a:buNone/>
+              <a:defRPr sz="1500"/>
             </a:lvl7pPr>
-            <a:lvl8pPr marL="3200400" indent="0">
-              <a:buNone/>
-              <a:defRPr sz="2000"/>
+            <a:lvl8pPr marL="2400300" indent="0">
+              <a:buNone/>
+              <a:defRPr sz="1500"/>
             </a:lvl8pPr>
-            <a:lvl9pPr marL="3657600" indent="0">
-              <a:buNone/>
-              <a:defRPr sz="2000"/>
+            <a:lvl9pPr marL="2743200" indent="0">
+              <a:buNone/>
+              <a:defRPr sz="1500"/>
             </a:lvl9pPr>
           </a:lstStyle>
           <a:p>
@@ -2466,8 +2447,8 @@
         </p:nvSpPr>
         <p:spPr>
           <a:xfrm>
-            <a:off x="1792288" y="5367338"/>
-            <a:ext cx="5486400" cy="804862"/>
+            <a:off x="1792288" y="4025503"/>
+            <a:ext cx="5486400" cy="603647"/>
           </a:xfrm>
         </p:spPr>
         <p:txBody>
@@ -2475,45 +2456,45 @@
           <a:lstStyle>
             <a:lvl1pPr marL="0" indent="0">
               <a:buNone/>
-              <a:defRPr sz="1400"/>
+              <a:defRPr sz="1050"/>
             </a:lvl1pPr>
-            <a:lvl2pPr marL="457200" indent="0">
-              <a:buNone/>
-              <a:defRPr sz="1200"/>
+            <a:lvl2pPr marL="342900" indent="0">
+              <a:buNone/>
+              <a:defRPr sz="900"/>
             </a:lvl2pPr>
-            <a:lvl3pPr marL="914400" indent="0">
-              <a:buNone/>
-              <a:defRPr sz="1000"/>
+            <a:lvl3pPr marL="685800" indent="0">
+              <a:buNone/>
+              <a:defRPr sz="750"/>
             </a:lvl3pPr>
-            <a:lvl4pPr marL="1371600" indent="0">
-              <a:buNone/>
-              <a:defRPr sz="900"/>
+            <a:lvl4pPr marL="1028700" indent="0">
+              <a:buNone/>
+              <a:defRPr sz="675"/>
             </a:lvl4pPr>
-            <a:lvl5pPr marL="1828800" indent="0">
-              <a:buNone/>
-              <a:defRPr sz="900"/>
+            <a:lvl5pPr marL="1371600" indent="0">
+              <a:buNone/>
+              <a:defRPr sz="675"/>
             </a:lvl5pPr>
-            <a:lvl6pPr marL="2286000" indent="0">
-              <a:buNone/>
-              <a:defRPr sz="900"/>
+            <a:lvl6pPr marL="1714500" indent="0">
+              <a:buNone/>
+              <a:defRPr sz="675"/>
             </a:lvl6pPr>
-            <a:lvl7pPr marL="2743200" indent="0">
-              <a:buNone/>
-              <a:defRPr sz="900"/>
+            <a:lvl7pPr marL="2057400" indent="0">
+              <a:buNone/>
+              <a:defRPr sz="675"/>
             </a:lvl7pPr>
-            <a:lvl8pPr marL="3200400" indent="0">
-              <a:buNone/>
-              <a:defRPr sz="900"/>
+            <a:lvl8pPr marL="2400300" indent="0">
+              <a:buNone/>
+              <a:defRPr sz="675"/>
             </a:lvl8pPr>
-            <a:lvl9pPr marL="3657600" indent="0">
-              <a:buNone/>
-              <a:defRPr sz="900"/>
+            <a:lvl9pPr marL="2743200" indent="0">
+              <a:buNone/>
+              <a:defRPr sz="675"/>
             </a:lvl9pPr>
           </a:lstStyle>
           <a:p>
             <a:pPr lvl="0"/>
             <a:r>
-              <a:rPr lang="en-US" smtClean="0"/>
+              <a:rPr lang="en-US"/>
               <a:t>Click to edit Master text styles</a:t>
             </a:r>
           </a:p>
@@ -2536,7 +2517,7 @@
           <a:p>
             <a:fld id="{241EB5C9-1307-BA42-ABA2-0BC069CD8E7F}" type="datetimeFigureOut">
               <a:rPr lang="en-US" smtClean="0"/>
-              <a:t>4/5/2019</a:t>
+              <a:t>1/2/22</a:t>
             </a:fld>
             <a:endParaRPr lang="en-US"/>
           </a:p>
@@ -2598,7 +2579,7 @@
 </file>
 
 <file path=ppt/slideMasters/slideMaster1.xml><?xml version="1.0" encoding="utf-8"?>
-<p:sldMaster xmlns:a="http://schemas.openxmlformats.org/drawingml/2006/main" xmlns:r="http://schemas.openxmlformats.org/officeDocument/2006/relationships" xmlns:p="http://schemas.openxmlformats.org/presentationml/2006/main">
+<p:sldMaster xmlns:a="http://schemas.openxmlformats.org/drawingml/2006/main" xmlns:p="http://schemas.openxmlformats.org/presentationml/2006/main" xmlns:r="http://schemas.openxmlformats.org/officeDocument/2006/relationships">
   <p:cSld>
     <p:bg>
       <p:bgRef idx="1001">
@@ -2631,24 +2612,23 @@
         </p:nvSpPr>
         <p:spPr>
           <a:xfrm>
-            <a:off x="457200" y="274638"/>
-            <a:ext cx="8229600" cy="1143000"/>
+            <a:off x="457200" y="205979"/>
+            <a:ext cx="8229600" cy="857250"/>
           </a:xfrm>
           <a:prstGeom prst="rect">
             <a:avLst/>
           </a:prstGeom>
         </p:spPr>
         <p:txBody>
-          <a:bodyPr vert="horz" lIns="91440" tIns="45720" rIns="91440" bIns="45720" rtlCol="0" anchor="ctr">
+          <a:bodyPr anchor="ctr" bIns="45720" lIns="91440" rIns="91440" rtlCol="0" tIns="45720" vert="horz">
             <a:normAutofit/>
           </a:bodyPr>
           <a:lstStyle/>
           <a:p>
             <a:r>
-              <a:rPr lang="en-US" smtClean="0"/>
+              <a:rPr lang="en-US"/>
               <a:t>Click to edit Master title style</a:t>
             </a:r>
-            <a:endParaRPr lang="en-US"/>
           </a:p>
         </p:txBody>
       </p:sp>
@@ -2659,58 +2639,57 @@
             <a:spLocks noGrp="1"/>
           </p:cNvSpPr>
           <p:nvPr>
-            <p:ph type="body" idx="1"/>
+            <p:ph idx="1" type="body"/>
           </p:nvPr>
         </p:nvSpPr>
         <p:spPr>
           <a:xfrm>
-            <a:off x="457200" y="1600200"/>
-            <a:ext cx="8229600" cy="4525963"/>
+            <a:off x="457200" y="1200151"/>
+            <a:ext cx="8229600" cy="3394472"/>
           </a:xfrm>
           <a:prstGeom prst="rect">
             <a:avLst/>
           </a:prstGeom>
         </p:spPr>
         <p:txBody>
-          <a:bodyPr vert="horz" lIns="91440" tIns="45720" rIns="91440" bIns="45720" rtlCol="0">
+          <a:bodyPr bIns="45720" lIns="91440" rIns="91440" rtlCol="0" tIns="45720" vert="horz">
             <a:normAutofit/>
           </a:bodyPr>
           <a:lstStyle/>
           <a:p>
             <a:pPr lvl="0"/>
             <a:r>
-              <a:rPr lang="en-US" smtClean="0"/>
+              <a:rPr lang="en-US"/>
               <a:t>Click to edit Master text styles</a:t>
             </a:r>
           </a:p>
           <a:p>
             <a:pPr lvl="1"/>
             <a:r>
-              <a:rPr lang="en-US" smtClean="0"/>
+              <a:rPr lang="en-US"/>
               <a:t>Second level</a:t>
             </a:r>
           </a:p>
           <a:p>
             <a:pPr lvl="2"/>
             <a:r>
-              <a:rPr lang="en-US" smtClean="0"/>
+              <a:rPr lang="en-US"/>
               <a:t>Third level</a:t>
             </a:r>
           </a:p>
           <a:p>
             <a:pPr lvl="3"/>
             <a:r>
-              <a:rPr lang="en-US" smtClean="0"/>
+              <a:rPr lang="en-US"/>
               <a:t>Fourth level</a:t>
             </a:r>
           </a:p>
           <a:p>
             <a:pPr lvl="4"/>
             <a:r>
-              <a:rPr lang="en-US" smtClean="0"/>
+              <a:rPr lang="en-US"/>
               <a:t>Fifth level</a:t>
             </a:r>
-            <a:endParaRPr lang="en-US"/>
           </a:p>
         </p:txBody>
       </p:sp>
@@ -2721,23 +2700,23 @@
             <a:spLocks noGrp="1"/>
           </p:cNvSpPr>
           <p:nvPr>
-            <p:ph type="dt" sz="half" idx="2"/>
+            <p:ph idx="2" sz="half" type="dt"/>
           </p:nvPr>
         </p:nvSpPr>
         <p:spPr>
           <a:xfrm>
-            <a:off x="457200" y="6356350"/>
-            <a:ext cx="2133600" cy="365125"/>
+            <a:off x="457200" y="4767263"/>
+            <a:ext cx="2133600" cy="273844"/>
           </a:xfrm>
           <a:prstGeom prst="rect">
             <a:avLst/>
           </a:prstGeom>
         </p:spPr>
         <p:txBody>
-          <a:bodyPr vert="horz" lIns="91440" tIns="45720" rIns="91440" bIns="45720" rtlCol="0" anchor="ctr"/>
+          <a:bodyPr anchor="ctr" bIns="45720" lIns="91440" rIns="91440" rtlCol="0" tIns="45720" vert="horz"/>
           <a:lstStyle>
             <a:lvl1pPr algn="l">
-              <a:defRPr sz="1200">
+              <a:defRPr sz="900">
                 <a:solidFill>
                   <a:schemeClr val="tx1">
                     <a:tint val="75000"/>
@@ -2749,7 +2728,7 @@
           <a:p>
             <a:fld id="{241EB5C9-1307-BA42-ABA2-0BC069CD8E7F}" type="datetimeFigureOut">
               <a:rPr lang="en-US" smtClean="0"/>
-              <a:t>4/5/2019</a:t>
+              <a:t>1/2/22</a:t>
             </a:fld>
             <a:endParaRPr lang="en-US"/>
           </a:p>
@@ -2762,23 +2741,23 @@
             <a:spLocks noGrp="1"/>
           </p:cNvSpPr>
           <p:nvPr>
-            <p:ph type="ftr" sz="quarter" idx="3"/>
+            <p:ph idx="3" sz="quarter" type="ftr"/>
           </p:nvPr>
         </p:nvSpPr>
         <p:spPr>
           <a:xfrm>
-            <a:off x="3124200" y="6356350"/>
-            <a:ext cx="2895600" cy="365125"/>
+            <a:off x="3124200" y="4767263"/>
+            <a:ext cx="2895600" cy="273844"/>
           </a:xfrm>
           <a:prstGeom prst="rect">
             <a:avLst/>
           </a:prstGeom>
         </p:spPr>
         <p:txBody>
-          <a:bodyPr vert="horz" lIns="91440" tIns="45720" rIns="91440" bIns="45720" rtlCol="0" anchor="ctr"/>
+          <a:bodyPr anchor="ctr" bIns="45720" lIns="91440" rIns="91440" rtlCol="0" tIns="45720" vert="horz"/>
           <a:lstStyle>
             <a:lvl1pPr algn="ctr">
-              <a:defRPr sz="1200">
+              <a:defRPr sz="900">
                 <a:solidFill>
                   <a:schemeClr val="tx1">
                     <a:tint val="75000"/>
@@ -2799,23 +2778,23 @@
             <a:spLocks noGrp="1"/>
           </p:cNvSpPr>
           <p:nvPr>
-            <p:ph type="sldNum" sz="quarter" idx="4"/>
+            <p:ph idx="4" sz="quarter" type="sldNum"/>
           </p:nvPr>
         </p:nvSpPr>
         <p:spPr>
           <a:xfrm>
-            <a:off x="6553200" y="6356350"/>
-            <a:ext cx="2133600" cy="365125"/>
+            <a:off x="6553200" y="4767263"/>
+            <a:ext cx="2133600" cy="273844"/>
           </a:xfrm>
           <a:prstGeom prst="rect">
             <a:avLst/>
           </a:prstGeom>
         </p:spPr>
         <p:txBody>
-          <a:bodyPr vert="horz" lIns="91440" tIns="45720" rIns="91440" bIns="45720" rtlCol="0" anchor="ctr"/>
+          <a:bodyPr anchor="ctr" bIns="45720" lIns="91440" rIns="91440" rtlCol="0" tIns="45720" vert="horz"/>
           <a:lstStyle>
             <a:lvl1pPr algn="r">
-              <a:defRPr sz="1200">
+              <a:defRPr sz="900">
                 <a:solidFill>
                   <a:schemeClr val="tx1">
                     <a:tint val="75000"/>
@@ -2840,7 +2819,7 @@
       </p:ext>
     </p:extLst>
   </p:cSld>
-  <p:clrMap bg1="lt1" tx1="dk1" bg2="lt2" tx2="dk2" accent1="accent1" accent2="accent2" accent3="accent3" accent4="accent4" accent5="accent5" accent6="accent6" hlink="hlink" folHlink="folHlink"/>
+  <p:clrMap accent1="accent1" accent2="accent2" accent3="accent3" accent4="accent4" accent5="accent5" accent6="accent6" bg1="lt1" bg2="lt2" folHlink="folHlink" hlink="hlink" tx1="dk1" tx2="dk2"/>
   <p:sldLayoutIdLst>
     <p:sldLayoutId id="2147483649" r:id="rId1"/>
     <p:sldLayoutId id="2147483650" r:id="rId2"/>
@@ -2856,12 +2835,12 @@
   </p:sldLayoutIdLst>
   <p:txStyles>
     <p:titleStyle>
-      <a:lvl1pPr algn="ctr" defTabSz="457200" rtl="0" eaLnBrk="1" latinLnBrk="0" hangingPunct="1">
+      <a:lvl1pPr algn="ctr" defTabSz="342900" eaLnBrk="1" hangingPunct="1" latinLnBrk="0" rtl="0">
         <a:spcBef>
           <a:spcPct val="0"/>
         </a:spcBef>
         <a:buNone/>
-        <a:defRPr sz="4400" kern="1200">
+        <a:defRPr kern="1200" sz="3300">
           <a:solidFill>
             <a:schemeClr val="tx1"/>
           </a:solidFill>
@@ -2872,13 +2851,13 @@
       </a:lvl1pPr>
     </p:titleStyle>
     <p:bodyStyle>
-      <a:lvl1pPr marL="342900" indent="-342900" algn="l" defTabSz="457200" rtl="0" eaLnBrk="1" latinLnBrk="0" hangingPunct="1">
+      <a:lvl1pPr algn="l" defTabSz="342900" eaLnBrk="1" hangingPunct="1" indent="-342900" latinLnBrk="0" marL="342900" rtl="0">
         <a:spcBef>
           <a:spcPct val="20000"/>
         </a:spcBef>
         <a:buFont typeface="Arial"/>
         <a:buChar char="•"/>
-        <a:defRPr sz="3200" kern="1200">
+        <a:defRPr kern="1200" sz="2400">
           <a:solidFill>
             <a:schemeClr val="tx1"/>
           </a:solidFill>
@@ -2887,13 +2866,13 @@
           <a:cs typeface="+mn-cs"/>
         </a:defRPr>
       </a:lvl1pPr>
-      <a:lvl2pPr marL="742950" indent="-285750" algn="l" defTabSz="457200" rtl="0" eaLnBrk="1" latinLnBrk="0" hangingPunct="1">
+      <a:lvl2pPr algn="l" defTabSz="342900" eaLnBrk="1" hangingPunct="1" indent="-342900" latinLnBrk="0" marL="685800" rtl="0">
         <a:spcBef>
           <a:spcPct val="20000"/>
         </a:spcBef>
         <a:buFont typeface="Arial"/>
         <a:buChar char="–"/>
-        <a:defRPr sz="2800" kern="1200">
+        <a:defRPr kern="1200" sz="2100">
           <a:solidFill>
             <a:schemeClr val="tx1"/>
           </a:solidFill>
@@ -2902,13 +2881,13 @@
           <a:cs typeface="+mn-cs"/>
         </a:defRPr>
       </a:lvl2pPr>
-      <a:lvl3pPr marL="1143000" indent="-228600" algn="l" defTabSz="457200" rtl="0" eaLnBrk="1" latinLnBrk="0" hangingPunct="1">
+      <a:lvl3pPr algn="l" defTabSz="342900" eaLnBrk="1" hangingPunct="1" indent="-342900" latinLnBrk="0" marL="1028700" rtl="0">
         <a:spcBef>
           <a:spcPct val="20000"/>
         </a:spcBef>
         <a:buFont typeface="Arial"/>
         <a:buChar char="•"/>
-        <a:defRPr sz="2400" kern="1200">
+        <a:defRPr kern="1200" sz="1800">
           <a:solidFill>
             <a:schemeClr val="tx1"/>
           </a:solidFill>
@@ -2917,13 +2896,13 @@
           <a:cs typeface="+mn-cs"/>
         </a:defRPr>
       </a:lvl3pPr>
-      <a:lvl4pPr marL="1600200" indent="-228600" algn="l" defTabSz="457200" rtl="0" eaLnBrk="1" latinLnBrk="0" hangingPunct="1">
+      <a:lvl4pPr algn="l" defTabSz="342900" eaLnBrk="1" hangingPunct="1" indent="-342900" latinLnBrk="0" marL="1371600" rtl="0">
         <a:spcBef>
           <a:spcPct val="20000"/>
         </a:spcBef>
         <a:buFont typeface="Arial"/>
         <a:buChar char="–"/>
-        <a:defRPr sz="2000" kern="1200">
+        <a:defRPr kern="1200" sz="1500">
           <a:solidFill>
             <a:schemeClr val="tx1"/>
           </a:solidFill>
@@ -2932,13 +2911,13 @@
           <a:cs typeface="+mn-cs"/>
         </a:defRPr>
       </a:lvl4pPr>
-      <a:lvl5pPr marL="2057400" indent="-228600" algn="l" defTabSz="457200" rtl="0" eaLnBrk="1" latinLnBrk="0" hangingPunct="1">
+      <a:lvl5pPr algn="l" defTabSz="342900" eaLnBrk="1" hangingPunct="1" indent="-342900" latinLnBrk="0" marL="1714500" rtl="0">
         <a:spcBef>
           <a:spcPct val="20000"/>
         </a:spcBef>
         <a:buFont typeface="Arial"/>
         <a:buChar char="»"/>
-        <a:defRPr sz="2000" kern="1200">
+        <a:defRPr kern="1200" sz="1500">
           <a:solidFill>
             <a:schemeClr val="tx1"/>
           </a:solidFill>
@@ -2947,13 +2926,13 @@
           <a:cs typeface="+mn-cs"/>
         </a:defRPr>
       </a:lvl5pPr>
-      <a:lvl6pPr marL="2514600" indent="-228600" algn="l" defTabSz="457200" rtl="0" eaLnBrk="1" latinLnBrk="0" hangingPunct="1">
+      <a:lvl6pPr algn="l" defTabSz="342900" eaLnBrk="1" hangingPunct="1" indent="-342900" latinLnBrk="0" marL="2057400" rtl="0">
         <a:spcBef>
           <a:spcPct val="20000"/>
         </a:spcBef>
         <a:buFont typeface="Arial"/>
         <a:buChar char="•"/>
-        <a:defRPr sz="2000" kern="1200">
+        <a:defRPr kern="1200" sz="1500">
           <a:solidFill>
             <a:schemeClr val="tx1"/>
           </a:solidFill>
@@ -2962,13 +2941,13 @@
           <a:cs typeface="+mn-cs"/>
         </a:defRPr>
       </a:lvl6pPr>
-      <a:lvl7pPr marL="2971800" indent="-228600" algn="l" defTabSz="457200" rtl="0" eaLnBrk="1" latinLnBrk="0" hangingPunct="1">
+      <a:lvl7pPr algn="l" defTabSz="342900" eaLnBrk="1" hangingPunct="1" indent="-342900" latinLnBrk="0" marL="2400300" rtl="0">
         <a:spcBef>
           <a:spcPct val="20000"/>
         </a:spcBef>
         <a:buFont typeface="Arial"/>
         <a:buChar char="•"/>
-        <a:defRPr sz="2000" kern="1200">
+        <a:defRPr kern="1200" sz="1500">
           <a:solidFill>
             <a:schemeClr val="tx1"/>
           </a:solidFill>
@@ -2977,13 +2956,13 @@
           <a:cs typeface="+mn-cs"/>
         </a:defRPr>
       </a:lvl7pPr>
-      <a:lvl8pPr marL="3429000" indent="-228600" algn="l" defTabSz="457200" rtl="0" eaLnBrk="1" latinLnBrk="0" hangingPunct="1">
+      <a:lvl8pPr algn="l" defTabSz="342900" eaLnBrk="1" hangingPunct="1" indent="-342900" latinLnBrk="0" marL="2743200" rtl="0">
         <a:spcBef>
           <a:spcPct val="20000"/>
         </a:spcBef>
         <a:buFont typeface="Arial"/>
         <a:buChar char="•"/>
-        <a:defRPr sz="2000" kern="1200">
+        <a:defRPr kern="1200" sz="1500">
           <a:solidFill>
             <a:schemeClr val="tx1"/>
           </a:solidFill>
@@ -2992,13 +2971,13 @@
           <a:cs typeface="+mn-cs"/>
         </a:defRPr>
       </a:lvl8pPr>
-      <a:lvl9pPr marL="3886200" indent="-228600" algn="l" defTabSz="457200" rtl="0" eaLnBrk="1" latinLnBrk="0" hangingPunct="1">
+      <a:lvl9pPr algn="l" defTabSz="342900" eaLnBrk="1" hangingPunct="1" indent="-342900" latinLnBrk="0" marL="3086100" rtl="0">
         <a:spcBef>
           <a:spcPct val="20000"/>
         </a:spcBef>
         <a:buFont typeface="Arial"/>
         <a:buChar char="•"/>
-        <a:defRPr sz="2000" kern="1200">
+        <a:defRPr kern="1200" sz="1500">
           <a:solidFill>
             <a:schemeClr val="tx1"/>
           </a:solidFill>
@@ -3012,8 +2991,8 @@
       <a:defPPr>
         <a:defRPr lang="en-US"/>
       </a:defPPr>
-      <a:lvl1pPr marL="0" algn="l" defTabSz="457200" rtl="0" eaLnBrk="1" latinLnBrk="0" hangingPunct="1">
-        <a:defRPr sz="1800" kern="1200">
+      <a:lvl1pPr algn="l" defTabSz="342900" eaLnBrk="1" hangingPunct="1" latinLnBrk="0" marL="0" rtl="0">
+        <a:defRPr kern="1200" sz="1350">
           <a:solidFill>
             <a:schemeClr val="tx1"/>
           </a:solidFill>
@@ -3022,8 +3001,8 @@
           <a:cs typeface="+mn-cs"/>
         </a:defRPr>
       </a:lvl1pPr>
-      <a:lvl2pPr marL="457200" algn="l" defTabSz="457200" rtl="0" eaLnBrk="1" latinLnBrk="0" hangingPunct="1">
-        <a:defRPr sz="1800" kern="1200">
+      <a:lvl2pPr algn="l" defTabSz="342900" eaLnBrk="1" hangingPunct="1" latinLnBrk="0" marL="342900" rtl="0">
+        <a:defRPr kern="1200" sz="1350">
           <a:solidFill>
             <a:schemeClr val="tx1"/>
           </a:solidFill>
@@ -3032,8 +3011,8 @@
           <a:cs typeface="+mn-cs"/>
         </a:defRPr>
       </a:lvl2pPr>
-      <a:lvl3pPr marL="914400" algn="l" defTabSz="457200" rtl="0" eaLnBrk="1" latinLnBrk="0" hangingPunct="1">
-        <a:defRPr sz="1800" kern="1200">
+      <a:lvl3pPr algn="l" defTabSz="342900" eaLnBrk="1" hangingPunct="1" latinLnBrk="0" marL="685800" rtl="0">
+        <a:defRPr kern="1200" sz="1350">
           <a:solidFill>
             <a:schemeClr val="tx1"/>
           </a:solidFill>
@@ -3042,8 +3021,8 @@
           <a:cs typeface="+mn-cs"/>
         </a:defRPr>
       </a:lvl3pPr>
-      <a:lvl4pPr marL="1371600" algn="l" defTabSz="457200" rtl="0" eaLnBrk="1" latinLnBrk="0" hangingPunct="1">
-        <a:defRPr sz="1800" kern="1200">
+      <a:lvl4pPr algn="l" defTabSz="342900" eaLnBrk="1" hangingPunct="1" latinLnBrk="0" marL="1028700" rtl="0">
+        <a:defRPr kern="1200" sz="1350">
           <a:solidFill>
             <a:schemeClr val="tx1"/>
           </a:solidFill>
@@ -3052,8 +3031,8 @@
           <a:cs typeface="+mn-cs"/>
         </a:defRPr>
       </a:lvl4pPr>
-      <a:lvl5pPr marL="1828800" algn="l" defTabSz="457200" rtl="0" eaLnBrk="1" latinLnBrk="0" hangingPunct="1">
-        <a:defRPr sz="1800" kern="1200">
+      <a:lvl5pPr algn="l" defTabSz="342900" eaLnBrk="1" hangingPunct="1" latinLnBrk="0" marL="1371600" rtl="0">
+        <a:defRPr kern="1200" sz="1350">
           <a:solidFill>
             <a:schemeClr val="tx1"/>
           </a:solidFill>
@@ -3062,8 +3041,8 @@
           <a:cs typeface="+mn-cs"/>
         </a:defRPr>
       </a:lvl5pPr>
-      <a:lvl6pPr marL="2286000" algn="l" defTabSz="457200" rtl="0" eaLnBrk="1" latinLnBrk="0" hangingPunct="1">
-        <a:defRPr sz="1800" kern="1200">
+      <a:lvl6pPr algn="l" defTabSz="342900" eaLnBrk="1" hangingPunct="1" latinLnBrk="0" marL="1714500" rtl="0">
+        <a:defRPr kern="1200" sz="1350">
           <a:solidFill>
             <a:schemeClr val="tx1"/>
           </a:solidFill>
@@ -3072,8 +3051,8 @@
           <a:cs typeface="+mn-cs"/>
         </a:defRPr>
       </a:lvl6pPr>
-      <a:lvl7pPr marL="2743200" algn="l" defTabSz="457200" rtl="0" eaLnBrk="1" latinLnBrk="0" hangingPunct="1">
-        <a:defRPr sz="1800" kern="1200">
+      <a:lvl7pPr algn="l" defTabSz="342900" eaLnBrk="1" hangingPunct="1" latinLnBrk="0" marL="2057400" rtl="0">
+        <a:defRPr kern="1200" sz="1350">
           <a:solidFill>
             <a:schemeClr val="tx1"/>
           </a:solidFill>
@@ -3082,8 +3061,8 @@
           <a:cs typeface="+mn-cs"/>
         </a:defRPr>
       </a:lvl7pPr>
-      <a:lvl8pPr marL="3200400" algn="l" defTabSz="457200" rtl="0" eaLnBrk="1" latinLnBrk="0" hangingPunct="1">
-        <a:defRPr sz="1800" kern="1200">
+      <a:lvl8pPr algn="l" defTabSz="342900" eaLnBrk="1" hangingPunct="1" latinLnBrk="0" marL="2400300" rtl="0">
+        <a:defRPr kern="1200" sz="1350">
           <a:solidFill>
             <a:schemeClr val="tx1"/>
           </a:solidFill>
@@ -3092,8 +3071,8 @@
           <a:cs typeface="+mn-cs"/>
         </a:defRPr>
       </a:lvl8pPr>
-      <a:lvl9pPr marL="3657600" algn="l" defTabSz="457200" rtl="0" eaLnBrk="1" latinLnBrk="0" hangingPunct="1">
-        <a:defRPr sz="1800" kern="1200">
+      <a:lvl9pPr algn="l" defTabSz="342900" eaLnBrk="1" hangingPunct="1" latinLnBrk="0" marL="2743200" rtl="0">
+        <a:defRPr kern="1200" sz="1350">
           <a:solidFill>
             <a:schemeClr val="tx1"/>
           </a:solidFill>
@@ -3136,15 +3115,15 @@
         </p:nvSpPr>
         <p:spPr>
           <a:xfrm>
-            <a:off x="685800" y="2130425"/>
-            <a:ext cx="7772400" cy="1470025"/>
+            <a:off x="685800" y="1597819"/>
+            <a:ext cx="7772400" cy="1102519"/>
           </a:xfrm>
         </p:spPr>
         <p:txBody>
           <a:bodyPr/>
           <a:lstStyle/>
           <a:p>
-            <a:pPr lvl="0" marL="0" indent="0">
+            <a:pPr lvl="0" indent="0" marL="0">
               <a:buNone/>
             </a:pPr>
             <a:r>
@@ -3166,68 +3145,52 @@
         </p:nvSpPr>
         <p:spPr>
           <a:xfrm>
-            <a:off x="1371600" y="3886200"/>
-            <a:ext cx="6400800" cy="1752600"/>
+            <a:off x="1371600" y="2914650"/>
+            <a:ext cx="6400800" cy="1314450"/>
           </a:xfrm>
         </p:spPr>
         <p:txBody>
           <a:bodyPr/>
           <a:lstStyle/>
           <a:p>
-            <a:pPr lvl="0" marL="0" indent="0">
+            <a:pPr lvl="0" indent="0" marL="0">
               <a:buNone/>
             </a:pPr>
             <a:br/>
             <a:br/>
             <a:r>
               <a:rPr/>
-              <a:t>Hiroki</a:t>
-            </a:r>
+              <a:t>Hiroki Kato</a:t>
+            </a:r>
+            <a:br/>
             <a:r>
               <a:rPr/>
-              <a:t> </a:t>
-            </a:r>
+              <a:t>Fumio Ohtake</a:t>
+            </a:r>
+          </a:p>
+        </p:txBody>
+      </p:sp>
+      <p:sp>
+        <p:nvSpPr>
+          <p:cNvPr id="4" name="Date Placeholder 3"/>
+          <p:cNvSpPr>
+            <a:spLocks noGrp="1"/>
+          </p:cNvSpPr>
+          <p:nvPr>
+            <p:ph idx="10" sz="half" type="dt"/>
+          </p:nvPr>
+        </p:nvSpPr>
+        <p:spPr/>
+        <p:txBody>
+          <a:bodyPr/>
+          <a:lstStyle/>
+          <a:p>
+            <a:pPr lvl="0" indent="0" marL="0">
+              <a:buNone/>
+            </a:pPr>
             <a:r>
               <a:rPr/>
-              <a:t>Kato</a:t>
-            </a:r>
-            <a:br/>
-            <a:r>
-              <a:rPr/>
-              <a:t>Fumio</a:t>
-            </a:r>
-            <a:r>
-              <a:rPr/>
-              <a:t> </a:t>
-            </a:r>
-            <a:r>
-              <a:rPr/>
-              <a:t>Ohtake</a:t>
-            </a:r>
-          </a:p>
-        </p:txBody>
-      </p:sp>
-      <p:sp>
-        <p:nvSpPr>
-          <p:cNvPr id="4" name="Date Placeholder 3"/>
-          <p:cNvSpPr>
-            <a:spLocks noGrp="1"/>
-          </p:cNvSpPr>
-          <p:nvPr>
-            <p:ph idx="10" sz="half" type="dt"/>
-          </p:nvPr>
-        </p:nvSpPr>
-        <p:spPr/>
-        <p:txBody>
-          <a:bodyPr/>
-          <a:lstStyle/>
-          <a:p>
-            <a:pPr lvl="0" marL="0" indent="0">
-              <a:buNone/>
-            </a:pPr>
-            <a:r>
-              <a:rPr/>
-              <a:t>2022/06/27</a:t>
+              <a:t>2022/07/01</a:t>
             </a:r>
           </a:p>
         </p:txBody>
@@ -3269,7 +3232,7 @@
           <a:bodyPr/>
           <a:lstStyle/>
           <a:p>
-            <a:pPr lvl="0" marL="0" indent="0">
+            <a:pPr lvl="0" indent="0" marL="0">
               <a:buNone/>
             </a:pPr>
             <a:r>
@@ -3281,7 +3244,7 @@
       </p:sp>
       <p:pic>
         <p:nvPicPr>
-          <p:cNvPr descr="C:/Users/vge00/Desktop/JMDP-nudge-proj/RCT-Nudge/docs/pptx/report_files/figure-pptx/ttest-4-6step-male-first-1.png" id="0" name="Picture 1"/>
+          <p:cNvPr descr="fig:  C:/Users/vge00/Desktop/JMDP-behavioral-economics/RCT-Nudge/docs/pptx/report_files/figure-pptx/ttest-4-6step-male-first-1.png" id="0" name="Picture 1"/>
           <p:cNvPicPr>
             <a:picLocks noGrp="1" noChangeAspect="1"/>
           </p:cNvPicPr>
@@ -3295,8 +3258,8 @@
         </p:blipFill>
         <p:spPr bwMode="auto">
           <a:xfrm>
-            <a:off x="558800" y="1600200"/>
-            <a:ext cx="8026400" cy="4013200"/>
+            <a:off x="1689100" y="1193800"/>
+            <a:ext cx="5765800" cy="2882900"/>
           </a:xfrm>
           <a:prstGeom prst="rect">
             <a:avLst/>
@@ -3317,7 +3280,7 @@
         </p:nvSpPr>
         <p:spPr>
           <a:xfrm>
-            <a:off x="457200" y="5613400"/>
+            <a:off x="457200" y="4076700"/>
             <a:ext cx="8229600" cy="508000"/>
           </a:xfrm>
           <a:prstGeom prst="rect">
@@ -3329,76 +3292,12 @@
           <a:bodyPr/>
           <a:lstStyle/>
           <a:p>
-            <a:pPr lvl="0" marL="0" indent="0" algn="ctr">
+            <a:pPr lvl="0" indent="0" marL="0" algn="ctr">
               <a:buNone/>
             </a:pPr>
             <a:r>
               <a:rPr/>
-              <a:t>Average</a:t>
-            </a:r>
-            <a:r>
-              <a:rPr/>
-              <a:t> </a:t>
-            </a:r>
-            <a:r>
-              <a:rPr/>
-              <a:t>of</a:t>
-            </a:r>
-            <a:r>
-              <a:rPr/>
-              <a:t> </a:t>
-            </a:r>
-            <a:r>
-              <a:rPr/>
-              <a:t>Outcomes</a:t>
-            </a:r>
-            <a:r>
-              <a:rPr/>
-              <a:t> </a:t>
-            </a:r>
-            <a:r>
-              <a:rPr/>
-              <a:t>after</a:t>
-            </a:r>
-            <a:r>
-              <a:rPr/>
-              <a:t> </a:t>
-            </a:r>
-            <a:r>
-              <a:rPr/>
-              <a:t>Donor</a:t>
-            </a:r>
-            <a:r>
-              <a:rPr/>
-              <a:t> </a:t>
-            </a:r>
-            <a:r>
-              <a:rPr/>
-              <a:t>Candidate</a:t>
-            </a:r>
-            <a:r>
-              <a:rPr/>
-              <a:t> </a:t>
-            </a:r>
-            <a:r>
-              <a:rPr/>
-              <a:t>Selection</a:t>
-            </a:r>
-            <a:r>
-              <a:rPr/>
-              <a:t> </a:t>
-            </a:r>
-            <a:r>
-              <a:rPr/>
-              <a:t>among</a:t>
-            </a:r>
-            <a:r>
-              <a:rPr/>
-              <a:t> </a:t>
-            </a:r>
-            <a:r>
-              <a:rPr/>
-              <a:t>Males</a:t>
+              <a:t>Average of Outcomes after Donor Candidate Selection among Males</a:t>
             </a:r>
           </a:p>
         </p:txBody>
@@ -3440,7 +3339,7 @@
           <a:bodyPr/>
           <a:lstStyle/>
           <a:p>
-            <a:pPr lvl="0" marL="0" indent="0">
+            <a:pPr lvl="0" indent="0" marL="0">
               <a:buNone/>
             </a:pPr>
             <a:r>
@@ -3452,7 +3351,7 @@
       </p:sp>
       <p:pic>
         <p:nvPicPr>
-          <p:cNvPr descr="C:/Users/vge00/Desktop/JMDP-nudge-proj/RCT-Nudge/docs/pptx/report_files/figure-pptx/ttest-1-3step-female-first-1.png" id="0" name="Picture 1"/>
+          <p:cNvPr descr="fig:  C:/Users/vge00/Desktop/JMDP-behavioral-economics/RCT-Nudge/docs/pptx/report_files/figure-pptx/ttest-1-3step-female-first-1.png" id="0" name="Picture 1"/>
           <p:cNvPicPr>
             <a:picLocks noGrp="1" noChangeAspect="1"/>
           </p:cNvPicPr>
@@ -3466,8 +3365,8 @@
         </p:blipFill>
         <p:spPr bwMode="auto">
           <a:xfrm>
-            <a:off x="558800" y="1600200"/>
-            <a:ext cx="8026400" cy="4013200"/>
+            <a:off x="1689100" y="1193800"/>
+            <a:ext cx="5765800" cy="2882900"/>
           </a:xfrm>
           <a:prstGeom prst="rect">
             <a:avLst/>
@@ -3488,7 +3387,7 @@
         </p:nvSpPr>
         <p:spPr>
           <a:xfrm>
-            <a:off x="457200" y="5613400"/>
+            <a:off x="457200" y="4076700"/>
             <a:ext cx="8229600" cy="508000"/>
           </a:xfrm>
           <a:prstGeom prst="rect">
@@ -3500,76 +3399,12 @@
           <a:bodyPr/>
           <a:lstStyle/>
           <a:p>
-            <a:pPr lvl="0" marL="0" indent="0" algn="ctr">
+            <a:pPr lvl="0" indent="0" marL="0" algn="ctr">
               <a:buNone/>
             </a:pPr>
             <a:r>
               <a:rPr/>
-              <a:t>Average</a:t>
-            </a:r>
-            <a:r>
-              <a:rPr/>
-              <a:t> </a:t>
-            </a:r>
-            <a:r>
-              <a:rPr/>
-              <a:t>of</a:t>
-            </a:r>
-            <a:r>
-              <a:rPr/>
-              <a:t> </a:t>
-            </a:r>
-            <a:r>
-              <a:rPr/>
-              <a:t>Outcomes</a:t>
-            </a:r>
-            <a:r>
-              <a:rPr/>
-              <a:t> </a:t>
-            </a:r>
-            <a:r>
-              <a:rPr/>
-              <a:t>before</a:t>
-            </a:r>
-            <a:r>
-              <a:rPr/>
-              <a:t> </a:t>
-            </a:r>
-            <a:r>
-              <a:rPr/>
-              <a:t>Donor</a:t>
-            </a:r>
-            <a:r>
-              <a:rPr/>
-              <a:t> </a:t>
-            </a:r>
-            <a:r>
-              <a:rPr/>
-              <a:t>Candidate</a:t>
-            </a:r>
-            <a:r>
-              <a:rPr/>
-              <a:t> </a:t>
-            </a:r>
-            <a:r>
-              <a:rPr/>
-              <a:t>Selection</a:t>
-            </a:r>
-            <a:r>
-              <a:rPr/>
-              <a:t> </a:t>
-            </a:r>
-            <a:r>
-              <a:rPr/>
-              <a:t>among</a:t>
-            </a:r>
-            <a:r>
-              <a:rPr/>
-              <a:t> </a:t>
-            </a:r>
-            <a:r>
-              <a:rPr/>
-              <a:t>Females</a:t>
+              <a:t>Average of Outcomes before Donor Candidate Selection among Females</a:t>
             </a:r>
           </a:p>
         </p:txBody>
@@ -3611,7 +3446,7 @@
           <a:bodyPr/>
           <a:lstStyle/>
           <a:p>
-            <a:pPr lvl="0" marL="0" indent="0">
+            <a:pPr lvl="0" indent="0" marL="0">
               <a:buNone/>
             </a:pPr>
             <a:r>
@@ -3623,7 +3458,7 @@
       </p:sp>
       <p:pic>
         <p:nvPicPr>
-          <p:cNvPr descr="C:/Users/vge00/Desktop/JMDP-nudge-proj/RCT-Nudge/docs/pptx/report_files/figure-pptx/ttest-4-6step-female-first-1.png" id="0" name="Picture 1"/>
+          <p:cNvPr descr="fig:  C:/Users/vge00/Desktop/JMDP-behavioral-economics/RCT-Nudge/docs/pptx/report_files/figure-pptx/ttest-4-6step-female-first-1.png" id="0" name="Picture 1"/>
           <p:cNvPicPr>
             <a:picLocks noGrp="1" noChangeAspect="1"/>
           </p:cNvPicPr>
@@ -3637,8 +3472,8 @@
         </p:blipFill>
         <p:spPr bwMode="auto">
           <a:xfrm>
-            <a:off x="558800" y="1600200"/>
-            <a:ext cx="8026400" cy="4013200"/>
+            <a:off x="1689100" y="1193800"/>
+            <a:ext cx="5765800" cy="2882900"/>
           </a:xfrm>
           <a:prstGeom prst="rect">
             <a:avLst/>
@@ -3659,7 +3494,7 @@
         </p:nvSpPr>
         <p:spPr>
           <a:xfrm>
-            <a:off x="457200" y="5613400"/>
+            <a:off x="457200" y="4076700"/>
             <a:ext cx="8229600" cy="508000"/>
           </a:xfrm>
           <a:prstGeom prst="rect">
@@ -3671,76 +3506,12 @@
           <a:bodyPr/>
           <a:lstStyle/>
           <a:p>
-            <a:pPr lvl="0" marL="0" indent="0" algn="ctr">
+            <a:pPr lvl="0" indent="0" marL="0" algn="ctr">
               <a:buNone/>
             </a:pPr>
             <a:r>
               <a:rPr/>
-              <a:t>Average</a:t>
-            </a:r>
-            <a:r>
-              <a:rPr/>
-              <a:t> </a:t>
-            </a:r>
-            <a:r>
-              <a:rPr/>
-              <a:t>of</a:t>
-            </a:r>
-            <a:r>
-              <a:rPr/>
-              <a:t> </a:t>
-            </a:r>
-            <a:r>
-              <a:rPr/>
-              <a:t>Outcomes</a:t>
-            </a:r>
-            <a:r>
-              <a:rPr/>
-              <a:t> </a:t>
-            </a:r>
-            <a:r>
-              <a:rPr/>
-              <a:t>after</a:t>
-            </a:r>
-            <a:r>
-              <a:rPr/>
-              <a:t> </a:t>
-            </a:r>
-            <a:r>
-              <a:rPr/>
-              <a:t>Donor</a:t>
-            </a:r>
-            <a:r>
-              <a:rPr/>
-              <a:t> </a:t>
-            </a:r>
-            <a:r>
-              <a:rPr/>
-              <a:t>Candidate</a:t>
-            </a:r>
-            <a:r>
-              <a:rPr/>
-              <a:t> </a:t>
-            </a:r>
-            <a:r>
-              <a:rPr/>
-              <a:t>Selection</a:t>
-            </a:r>
-            <a:r>
-              <a:rPr/>
-              <a:t> </a:t>
-            </a:r>
-            <a:r>
-              <a:rPr/>
-              <a:t>among</a:t>
-            </a:r>
-            <a:r>
-              <a:rPr/>
-              <a:t> </a:t>
-            </a:r>
-            <a:r>
-              <a:rPr/>
-              <a:t>Females</a:t>
+              <a:t>Average of Outcomes after Donor Candidate Selection among Females</a:t>
             </a:r>
           </a:p>
         </p:txBody>
@@ -3782,7 +3553,7 @@
           <a:bodyPr/>
           <a:lstStyle/>
           <a:p>
-            <a:pPr lvl="0" marL="0" indent="0">
+            <a:pPr lvl="0" indent="0" marL="0">
               <a:buNone/>
             </a:pPr>
             <a:r>
@@ -3807,21 +3578,21 @@
           <a:bodyPr/>
           <a:lstStyle/>
           <a:p>
-            <a:pPr lvl="1"/>
+            <a:pPr lvl="0"/>
             <a:r>
               <a:rPr/>
               <a:t>男性：移植希望患者とマッチする確率が低いことを強調したメッセージが返信・意向・確認検査の実施に正の影響を与えた</a:t>
             </a:r>
           </a:p>
           <a:p>
-            <a:pPr lvl="2"/>
+            <a:pPr lvl="1"/>
             <a:r>
               <a:rPr/>
               <a:t>この結果は年齢・都道府県・月の固定効果・週の固定効果をコントロールした回帰分析でも同じ結果となった</a:t>
             </a:r>
           </a:p>
           <a:p>
-            <a:pPr lvl="1"/>
+            <a:pPr lvl="0"/>
             <a:r>
               <a:rPr/>
               <a:t>女性：回帰分析では、t検定で統計的に有意な群間の差が統計的に非有意となるので、頑健なメッセージの効果を得られなかった</a:t>
@@ -3866,7 +3637,7 @@
           <a:bodyPr/>
           <a:lstStyle/>
           <a:p>
-            <a:pPr lvl="0" marL="0" indent="0">
+            <a:pPr lvl="0" indent="0" marL="0">
               <a:buNone/>
             </a:pPr>
             <a:r>
@@ -3891,14 +3662,14 @@
           <a:bodyPr/>
           <a:lstStyle/>
           <a:p>
-            <a:pPr lvl="1"/>
+            <a:pPr lvl="0"/>
             <a:r>
               <a:rPr/>
               <a:t>地域や年齢の視点からメッセージ効果の異質性を詳細に検討する。</a:t>
             </a:r>
           </a:p>
           <a:p>
-            <a:pPr lvl="1"/>
+            <a:pPr lvl="0"/>
             <a:r>
               <a:rPr/>
               <a:t>Random causal forest (Wager and Athey, 2015)を用いた分析も検討する。</a:t>
@@ -3943,7 +3714,7 @@
           <a:bodyPr/>
           <a:lstStyle/>
           <a:p>
-            <a:pPr lvl="0" marL="0" indent="0">
+            <a:pPr lvl="0" indent="0" marL="0">
               <a:buNone/>
             </a:pPr>
             <a:r>
@@ -3970,7 +3741,7 @@
               <a:bodyPr/>
               <a:lstStyle/>
               <a:p>
-                <a:pPr lvl="1"/>
+                <a:pPr lvl="0"/>
                 <a:r>
                   <a:rPr/>
                   <a:t>対象：骨髄バンクドナー確定後に「適合通知」を受け取るドナー候補者（</a:t>
@@ -4006,21 +3777,21 @@
                 </a:r>
               </a:p>
               <a:p>
-                <a:pPr lvl="1"/>
+                <a:pPr lvl="0"/>
                 <a:r>
                   <a:rPr/>
                   <a:t>介入：ドナー候補者確定後に送付する「適合通知」の内容に以下のメッセージを加える</a:t>
                 </a:r>
               </a:p>
               <a:p>
-                <a:pPr lvl="2"/>
+                <a:pPr lvl="1"/>
                 <a:r>
                   <a:rPr/>
                   <a:t>確率メッセージ：「１人の登録患者さんとHLA型が一致するドナー登録者は数百〜数万人に1人です。 ドナー候補者が複数みつかる場合もありますが、多くはないこともご理解頂ければ幸いです。」</a:t>
                 </a:r>
               </a:p>
               <a:p>
-                <a:pPr lvl="2"/>
+                <a:pPr lvl="1"/>
                 <a:r>
                   <a:rPr/>
                   <a:t>移植患者情報：「骨髄バンクを介して移植ができる患者さんは現在約6割にとどまっています。 骨髄等を提供するドナーが早く見つかれば、その比率を高めることができます。」</a:t>
@@ -4067,7 +3838,7 @@
           <a:bodyPr/>
           <a:lstStyle/>
           <a:p>
-            <a:pPr lvl="0" marL="0" indent="0">
+            <a:pPr lvl="0" indent="0" marL="0">
               <a:buNone/>
             </a:pPr>
             <a:r>
@@ -4092,35 +3863,35 @@
           <a:bodyPr/>
           <a:lstStyle/>
           <a:p>
-            <a:pPr lvl="1"/>
+            <a:pPr lvl="0"/>
             <a:r>
               <a:rPr/>
               <a:t>A群（コントロール）：通常の適合通知</a:t>
             </a:r>
           </a:p>
           <a:p>
-            <a:pPr lvl="1"/>
+            <a:pPr lvl="0"/>
             <a:r>
               <a:rPr/>
               <a:t>B群（トリートメント1）：通常の適合通知＋確率メッセージ</a:t>
             </a:r>
           </a:p>
           <a:p>
-            <a:pPr lvl="1"/>
+            <a:pPr lvl="0"/>
             <a:r>
               <a:rPr/>
               <a:t>C群（トリートメント2）：通常の適合通知＋移植患者情報</a:t>
             </a:r>
           </a:p>
           <a:p>
-            <a:pPr lvl="1"/>
+            <a:pPr lvl="0"/>
             <a:r>
               <a:rPr/>
               <a:t>D群（トリートメント3）：通常の適合通知＋確率メッセージ＋移植患者情報</a:t>
             </a:r>
           </a:p>
           <a:p>
-            <a:pPr lvl="0" marL="0" indent="0">
+            <a:pPr lvl="0" indent="0" marL="0">
               <a:buNone/>
             </a:pPr>
             <a:r>
@@ -4167,7 +3938,7 @@
           <a:bodyPr/>
           <a:lstStyle/>
           <a:p>
-            <a:pPr lvl="0" marL="0" indent="0">
+            <a:pPr lvl="0" indent="0" marL="0">
               <a:buNone/>
             </a:pPr>
             <a:r>
@@ -4179,7 +3950,7 @@
       </p:sp>
       <p:pic>
         <p:nvPicPr>
-          <p:cNvPr descr="C:\Users\vge00\AppData\Local\Temp\RtmpWcCICy\file3f8c33145527.png" id="0" name="Picture 1"/>
+          <p:cNvPr descr="C:\Users\vge00\AppData\Local\Temp\Rtmp06NnH0\file3a4444515ee7.png" id="0" name="Picture 1"/>
           <p:cNvPicPr>
             <a:picLocks noGrp="1" noChangeAspect="1"/>
           </p:cNvPicPr>
@@ -4193,8 +3964,8 @@
         </p:blipFill>
         <p:spPr bwMode="auto">
           <a:xfrm>
-            <a:off x="952500" y="1600200"/>
-            <a:ext cx="7239000" cy="4521200"/>
+            <a:off x="1778000" y="1193800"/>
+            <a:ext cx="5588000" cy="3390900"/>
           </a:xfrm>
           <a:prstGeom prst="rect">
             <a:avLst/>
@@ -4244,7 +4015,7 @@
           <a:bodyPr/>
           <a:lstStyle/>
           <a:p>
-            <a:pPr lvl="0" marL="0" indent="0">
+            <a:pPr lvl="0" indent="0" marL="0">
               <a:buNone/>
             </a:pPr>
             <a:r>
@@ -4256,7 +4027,7 @@
       </p:sp>
       <p:pic>
         <p:nvPicPr>
-          <p:cNvPr descr="C:\Users\vge00\AppData\Local\Temp\RtmpWcCICy\file3f8c7aa1c.png" id="0" name="Picture 1"/>
+          <p:cNvPr descr="C:\Users\vge00\AppData\Local\Temp\Rtmp06NnH0\file3a4418232c6a.png" id="0" name="Picture 1"/>
           <p:cNvPicPr>
             <a:picLocks noGrp="1" noChangeAspect="1"/>
           </p:cNvPicPr>
@@ -4270,8 +4041,8 @@
         </p:blipFill>
         <p:spPr bwMode="auto">
           <a:xfrm>
-            <a:off x="1816100" y="1600200"/>
-            <a:ext cx="5511800" cy="4521200"/>
+            <a:off x="2692400" y="1193800"/>
+            <a:ext cx="3746500" cy="3390900"/>
           </a:xfrm>
           <a:prstGeom prst="rect">
             <a:avLst/>
@@ -4321,7 +4092,7 @@
           <a:bodyPr/>
           <a:lstStyle/>
           <a:p>
-            <a:pPr lvl="0" marL="0" indent="0">
+            <a:pPr lvl="0" indent="0" marL="0">
               <a:buNone/>
             </a:pPr>
             <a:r>
@@ -4346,7 +4117,7 @@
           <a:bodyPr/>
           <a:lstStyle/>
           <a:p>
-            <a:pPr lvl="1">
+            <a:pPr lvl="0" indent="-342900" marL="342900">
               <a:buAutoNum type="arabicPeriod"/>
             </a:pPr>
             <a:r>
@@ -4355,7 +4126,7 @@
             </a:r>
           </a:p>
           <a:p>
-            <a:pPr lvl="1">
+            <a:pPr lvl="0" indent="-342900" marL="342900">
               <a:buAutoNum type="arabicPeriod"/>
             </a:pPr>
             <a:r>
@@ -4364,7 +4135,7 @@
             </a:r>
           </a:p>
           <a:p>
-            <a:pPr lvl="1">
+            <a:pPr lvl="0" indent="-342900" marL="342900">
               <a:buAutoNum type="arabicPeriod"/>
             </a:pPr>
             <a:r>
@@ -4373,7 +4144,7 @@
             </a:r>
           </a:p>
           <a:p>
-            <a:pPr lvl="0" marL="0" indent="0">
+            <a:pPr lvl="0" indent="0" marL="0">
               <a:buNone/>
             </a:pPr>
             <a:r>
@@ -4420,7 +4191,7 @@
           <a:bodyPr/>
           <a:lstStyle/>
           <a:p>
-            <a:pPr lvl="0" marL="0" indent="0">
+            <a:pPr lvl="0" indent="0" marL="0">
               <a:buNone/>
             </a:pPr>
             <a:r>
@@ -4445,7 +4216,7 @@
           <a:bodyPr/>
           <a:lstStyle/>
           <a:p>
-            <a:pPr lvl="1">
+            <a:pPr lvl="0" indent="-342900" marL="342900">
               <a:buAutoNum startAt="4" type="arabicPeriod"/>
             </a:pPr>
             <a:r>
@@ -4454,7 +4225,7 @@
             </a:r>
           </a:p>
           <a:p>
-            <a:pPr lvl="1">
+            <a:pPr lvl="0" indent="-342900" marL="342900">
               <a:buAutoNum startAt="4" type="arabicPeriod"/>
             </a:pPr>
             <a:r>
@@ -4463,7 +4234,7 @@
             </a:r>
           </a:p>
           <a:p>
-            <a:pPr lvl="1">
+            <a:pPr lvl="0" indent="-342900" marL="342900">
               <a:buAutoNum startAt="4" type="arabicPeriod"/>
             </a:pPr>
             <a:r>
@@ -4472,7 +4243,7 @@
             </a:r>
           </a:p>
           <a:p>
-            <a:pPr lvl="0" marL="0" indent="0">
+            <a:pPr lvl="0" indent="0" marL="0">
               <a:buNone/>
             </a:pPr>
             <a:r>
@@ -4519,20 +4290,12 @@
           <a:bodyPr/>
           <a:lstStyle/>
           <a:p>
-            <a:pPr lvl="0" marL="0" indent="0">
+            <a:pPr lvl="0" indent="0" marL="0">
               <a:buNone/>
             </a:pPr>
             <a:r>
               <a:rPr/>
-              <a:t>Difference-in-mean</a:t>
-            </a:r>
-            <a:r>
-              <a:rPr/>
-              <a:t> </a:t>
-            </a:r>
-            <a:r>
-              <a:rPr/>
-              <a:t>Test</a:t>
+              <a:t>Difference-in-mean Test</a:t>
             </a:r>
           </a:p>
         </p:txBody>
@@ -4552,21 +4315,21 @@
           <a:bodyPr/>
           <a:lstStyle/>
           <a:p>
-            <a:pPr lvl="1"/>
+            <a:pPr lvl="0"/>
             <a:r>
               <a:rPr/>
               <a:t>二群の平均値の差がゼロであるという帰無仮説をt検定で検定した</a:t>
             </a:r>
           </a:p>
           <a:p>
-            <a:pPr lvl="1"/>
+            <a:pPr lvl="0"/>
             <a:r>
               <a:rPr/>
               <a:t>初めてコーディネートを経験する人に限定した</a:t>
             </a:r>
           </a:p>
           <a:p>
-            <a:pPr lvl="1"/>
+            <a:pPr lvl="0"/>
             <a:r>
               <a:rPr/>
               <a:t>男性と女性にサンプルを分けて、分析した</a:t>
@@ -4611,7 +4374,7 @@
           <a:bodyPr/>
           <a:lstStyle/>
           <a:p>
-            <a:pPr lvl="0" marL="0" indent="0">
+            <a:pPr lvl="0" indent="0" marL="0">
               <a:buNone/>
             </a:pPr>
             <a:r>
@@ -4623,7 +4386,7 @@
       </p:sp>
       <p:pic>
         <p:nvPicPr>
-          <p:cNvPr descr="C:/Users/vge00/Desktop/JMDP-nudge-proj/RCT-Nudge/docs/pptx/report_files/figure-pptx/ttest-1-3step-male-first-1.png" id="0" name="Picture 1"/>
+          <p:cNvPr descr="fig:  C:/Users/vge00/Desktop/JMDP-behavioral-economics/RCT-Nudge/docs/pptx/report_files/figure-pptx/ttest-1-3step-male-first-1.png" id="0" name="Picture 1"/>
           <p:cNvPicPr>
             <a:picLocks noGrp="1" noChangeAspect="1"/>
           </p:cNvPicPr>
@@ -4637,8 +4400,8 @@
         </p:blipFill>
         <p:spPr bwMode="auto">
           <a:xfrm>
-            <a:off x="558800" y="1600200"/>
-            <a:ext cx="8026400" cy="4013200"/>
+            <a:off x="1689100" y="1193800"/>
+            <a:ext cx="5765800" cy="2882900"/>
           </a:xfrm>
           <a:prstGeom prst="rect">
             <a:avLst/>
@@ -4659,7 +4422,7 @@
         </p:nvSpPr>
         <p:spPr>
           <a:xfrm>
-            <a:off x="457200" y="5613400"/>
+            <a:off x="457200" y="4076700"/>
             <a:ext cx="8229600" cy="508000"/>
           </a:xfrm>
           <a:prstGeom prst="rect">
@@ -4671,76 +4434,12 @@
           <a:bodyPr/>
           <a:lstStyle/>
           <a:p>
-            <a:pPr lvl="0" marL="0" indent="0" algn="ctr">
+            <a:pPr lvl="0" indent="0" marL="0" algn="ctr">
               <a:buNone/>
             </a:pPr>
             <a:r>
               <a:rPr/>
-              <a:t>Average</a:t>
-            </a:r>
-            <a:r>
-              <a:rPr/>
-              <a:t> </a:t>
-            </a:r>
-            <a:r>
-              <a:rPr/>
-              <a:t>of</a:t>
-            </a:r>
-            <a:r>
-              <a:rPr/>
-              <a:t> </a:t>
-            </a:r>
-            <a:r>
-              <a:rPr/>
-              <a:t>Outcomes</a:t>
-            </a:r>
-            <a:r>
-              <a:rPr/>
-              <a:t> </a:t>
-            </a:r>
-            <a:r>
-              <a:rPr/>
-              <a:t>before</a:t>
-            </a:r>
-            <a:r>
-              <a:rPr/>
-              <a:t> </a:t>
-            </a:r>
-            <a:r>
-              <a:rPr/>
-              <a:t>Donor</a:t>
-            </a:r>
-            <a:r>
-              <a:rPr/>
-              <a:t> </a:t>
-            </a:r>
-            <a:r>
-              <a:rPr/>
-              <a:t>Candidate</a:t>
-            </a:r>
-            <a:r>
-              <a:rPr/>
-              <a:t> </a:t>
-            </a:r>
-            <a:r>
-              <a:rPr/>
-              <a:t>Selection</a:t>
-            </a:r>
-            <a:r>
-              <a:rPr/>
-              <a:t> </a:t>
-            </a:r>
-            <a:r>
-              <a:rPr/>
-              <a:t>among</a:t>
-            </a:r>
-            <a:r>
-              <a:rPr/>
-              <a:t> </a:t>
-            </a:r>
-            <a:r>
-              <a:rPr/>
-              <a:t>Males</a:t>
+              <a:t>Average of Outcomes before Donor Candidate Selection among Males</a:t>
             </a:r>
           </a:p>
         </p:txBody>
@@ -5068,4 +4767,265 @@
   </a:objectDefaults>
   <a:extraClrSchemeLst/>
 </a:theme>
+</file>
+
+<file path=ppt/theme/theme2.xml><?xml version="1.0" encoding="utf-8"?>
+<a:theme xmlns:a="http://schemas.openxmlformats.org/drawingml/2006/main" name="Office Theme">
+  <a:themeElements>
+    <a:clrScheme name="Office">
+      <a:dk1>
+        <a:sysClr val="windowText" lastClr="000000"/>
+      </a:dk1>
+      <a:lt1>
+        <a:sysClr val="window" lastClr="FFFFFF"/>
+      </a:lt1>
+      <a:dk2>
+        <a:srgbClr val="44546A"/>
+      </a:dk2>
+      <a:lt2>
+        <a:srgbClr val="E7E6E6"/>
+      </a:lt2>
+      <a:accent1>
+        <a:srgbClr val="5B9BD5"/>
+      </a:accent1>
+      <a:accent2>
+        <a:srgbClr val="ED7D31"/>
+      </a:accent2>
+      <a:accent3>
+        <a:srgbClr val="A5A5A5"/>
+      </a:accent3>
+      <a:accent4>
+        <a:srgbClr val="FFC000"/>
+      </a:accent4>
+      <a:accent5>
+        <a:srgbClr val="4472C4"/>
+      </a:accent5>
+      <a:accent6>
+        <a:srgbClr val="70AD47"/>
+      </a:accent6>
+      <a:hlink>
+        <a:srgbClr val="0563C1"/>
+      </a:hlink>
+      <a:folHlink>
+        <a:srgbClr val="954F72"/>
+      </a:folHlink>
+    </a:clrScheme>
+    <a:fontScheme name="Office">
+      <a:majorFont>
+        <a:latin typeface="Calibri Light" panose="020F0302020204030204"/>
+        <a:ea typeface=""/>
+        <a:cs typeface=""/>
+        <a:font script="Jpan" typeface="ＭＳ Ｐゴシック"/>
+        <a:font script="Hang" typeface="맑은 고딕"/>
+        <a:font script="Hans" typeface="宋体"/>
+        <a:font script="Hant" typeface="新細明體"/>
+        <a:font script="Arab" typeface="Times New Roman"/>
+        <a:font script="Hebr" typeface="Times New Roman"/>
+        <a:font script="Thai" typeface="Angsana New"/>
+        <a:font script="Ethi" typeface="Nyala"/>
+        <a:font script="Beng" typeface="Vrinda"/>
+        <a:font script="Gujr" typeface="Shruti"/>
+        <a:font script="Khmr" typeface="MoolBoran"/>
+        <a:font script="Knda" typeface="Tunga"/>
+        <a:font script="Guru" typeface="Raavi"/>
+        <a:font script="Cans" typeface="Euphemia"/>
+        <a:font script="Cher" typeface="Plantagenet Cherokee"/>
+        <a:font script="Yiii" typeface="Microsoft Yi Baiti"/>
+        <a:font script="Tibt" typeface="Microsoft Himalaya"/>
+        <a:font script="Thaa" typeface="MV Boli"/>
+        <a:font script="Deva" typeface="Mangal"/>
+        <a:font script="Telu" typeface="Gautami"/>
+        <a:font script="Taml" typeface="Latha"/>
+        <a:font script="Syrc" typeface="Estrangelo Edessa"/>
+        <a:font script="Orya" typeface="Kalinga"/>
+        <a:font script="Mlym" typeface="Kartika"/>
+        <a:font script="Laoo" typeface="DokChampa"/>
+        <a:font script="Sinh" typeface="Iskoola Pota"/>
+        <a:font script="Mong" typeface="Mongolian Baiti"/>
+        <a:font script="Viet" typeface="Times New Roman"/>
+        <a:font script="Uigh" typeface="Microsoft Uighur"/>
+        <a:font script="Geor" typeface="Sylfaen"/>
+      </a:majorFont>
+      <a:minorFont>
+        <a:latin typeface="Calibri" panose="020F0502020204030204"/>
+        <a:ea typeface=""/>
+        <a:cs typeface=""/>
+        <a:font script="Jpan" typeface="ＭＳ Ｐゴシック"/>
+        <a:font script="Hang" typeface="맑은 고딕"/>
+        <a:font script="Hans" typeface="宋体"/>
+        <a:font script="Hant" typeface="新細明體"/>
+        <a:font script="Arab" typeface="Arial"/>
+        <a:font script="Hebr" typeface="Arial"/>
+        <a:font script="Thai" typeface="Cordia New"/>
+        <a:font script="Ethi" typeface="Nyala"/>
+        <a:font script="Beng" typeface="Vrinda"/>
+        <a:font script="Gujr" typeface="Shruti"/>
+        <a:font script="Khmr" typeface="DaunPenh"/>
+        <a:font script="Knda" typeface="Tunga"/>
+        <a:font script="Guru" typeface="Raavi"/>
+        <a:font script="Cans" typeface="Euphemia"/>
+        <a:font script="Cher" typeface="Plantagenet Cherokee"/>
+        <a:font script="Yiii" typeface="Microsoft Yi Baiti"/>
+        <a:font script="Tibt" typeface="Microsoft Himalaya"/>
+        <a:font script="Thaa" typeface="MV Boli"/>
+        <a:font script="Deva" typeface="Mangal"/>
+        <a:font script="Telu" typeface="Gautami"/>
+        <a:font script="Taml" typeface="Latha"/>
+        <a:font script="Syrc" typeface="Estrangelo Edessa"/>
+        <a:font script="Orya" typeface="Kalinga"/>
+        <a:font script="Mlym" typeface="Kartika"/>
+        <a:font script="Laoo" typeface="DokChampa"/>
+        <a:font script="Sinh" typeface="Iskoola Pota"/>
+        <a:font script="Mong" typeface="Mongolian Baiti"/>
+        <a:font script="Viet" typeface="Arial"/>
+        <a:font script="Uigh" typeface="Microsoft Uighur"/>
+        <a:font script="Geor" typeface="Sylfaen"/>
+      </a:minorFont>
+    </a:fontScheme>
+    <a:fmtScheme name="Office">
+      <a:fillStyleLst>
+        <a:solidFill>
+          <a:schemeClr val="phClr"/>
+        </a:solidFill>
+        <a:gradFill rotWithShape="1">
+          <a:gsLst>
+            <a:gs pos="0">
+              <a:schemeClr val="phClr">
+                <a:lumMod val="110000"/>
+                <a:satMod val="105000"/>
+                <a:tint val="67000"/>
+              </a:schemeClr>
+            </a:gs>
+            <a:gs pos="50000">
+              <a:schemeClr val="phClr">
+                <a:lumMod val="105000"/>
+                <a:satMod val="103000"/>
+                <a:tint val="73000"/>
+              </a:schemeClr>
+            </a:gs>
+            <a:gs pos="100000">
+              <a:schemeClr val="phClr">
+                <a:lumMod val="105000"/>
+                <a:satMod val="109000"/>
+                <a:tint val="81000"/>
+              </a:schemeClr>
+            </a:gs>
+          </a:gsLst>
+          <a:lin ang="5400000" scaled="0"/>
+        </a:gradFill>
+        <a:gradFill rotWithShape="1">
+          <a:gsLst>
+            <a:gs pos="0">
+              <a:schemeClr val="phClr">
+                <a:satMod val="103000"/>
+                <a:lumMod val="102000"/>
+                <a:tint val="94000"/>
+              </a:schemeClr>
+            </a:gs>
+            <a:gs pos="50000">
+              <a:schemeClr val="phClr">
+                <a:satMod val="110000"/>
+                <a:lumMod val="100000"/>
+                <a:shade val="100000"/>
+              </a:schemeClr>
+            </a:gs>
+            <a:gs pos="100000">
+              <a:schemeClr val="phClr">
+                <a:lumMod val="99000"/>
+                <a:satMod val="120000"/>
+                <a:shade val="78000"/>
+              </a:schemeClr>
+            </a:gs>
+          </a:gsLst>
+          <a:lin ang="5400000" scaled="0"/>
+        </a:gradFill>
+      </a:fillStyleLst>
+      <a:lnStyleLst>
+        <a:ln w="6350" cap="flat" cmpd="sng" algn="ctr">
+          <a:solidFill>
+            <a:schemeClr val="phClr"/>
+          </a:solidFill>
+          <a:prstDash val="solid"/>
+          <a:miter lim="800000"/>
+        </a:ln>
+        <a:ln w="12700" cap="flat" cmpd="sng" algn="ctr">
+          <a:solidFill>
+            <a:schemeClr val="phClr"/>
+          </a:solidFill>
+          <a:prstDash val="solid"/>
+          <a:miter lim="800000"/>
+        </a:ln>
+        <a:ln w="19050" cap="flat" cmpd="sng" algn="ctr">
+          <a:solidFill>
+            <a:schemeClr val="phClr"/>
+          </a:solidFill>
+          <a:prstDash val="solid"/>
+          <a:miter lim="800000"/>
+        </a:ln>
+      </a:lnStyleLst>
+      <a:effectStyleLst>
+        <a:effectStyle>
+          <a:effectLst/>
+        </a:effectStyle>
+        <a:effectStyle>
+          <a:effectLst/>
+        </a:effectStyle>
+        <a:effectStyle>
+          <a:effectLst>
+            <a:outerShdw blurRad="57150" dist="19050" dir="5400000" algn="ctr" rotWithShape="0">
+              <a:srgbClr val="000000">
+                <a:alpha val="63000"/>
+              </a:srgbClr>
+            </a:outerShdw>
+          </a:effectLst>
+        </a:effectStyle>
+      </a:effectStyleLst>
+      <a:bgFillStyleLst>
+        <a:solidFill>
+          <a:schemeClr val="phClr"/>
+        </a:solidFill>
+        <a:solidFill>
+          <a:schemeClr val="phClr">
+            <a:tint val="95000"/>
+            <a:satMod val="170000"/>
+          </a:schemeClr>
+        </a:solidFill>
+        <a:gradFill rotWithShape="1">
+          <a:gsLst>
+            <a:gs pos="0">
+              <a:schemeClr val="phClr">
+                <a:tint val="93000"/>
+                <a:satMod val="150000"/>
+                <a:shade val="98000"/>
+                <a:lumMod val="102000"/>
+              </a:schemeClr>
+            </a:gs>
+            <a:gs pos="50000">
+              <a:schemeClr val="phClr">
+                <a:tint val="98000"/>
+                <a:satMod val="130000"/>
+                <a:shade val="90000"/>
+                <a:lumMod val="103000"/>
+              </a:schemeClr>
+            </a:gs>
+            <a:gs pos="100000">
+              <a:schemeClr val="phClr">
+                <a:shade val="63000"/>
+                <a:satMod val="120000"/>
+              </a:schemeClr>
+            </a:gs>
+          </a:gsLst>
+          <a:lin ang="5400000" scaled="0"/>
+        </a:gradFill>
+      </a:bgFillStyleLst>
+    </a:fmtScheme>
+  </a:themeElements>
+  <a:objectDefaults/>
+  <a:extraClrSchemeLst/>
+  <a:extLst>
+    <a:ext uri="{05A4C25C-085E-4340-85A3-A5531E510DB2}">
+      <thm15:themeFamily xmlns:thm15="http://schemas.microsoft.com/office/thememl/2012/main" name="Office Theme" id="{62F939B6-93AF-4DB8-9C6B-D6C7DFDC589F}" vid="{4A3C46E8-61CC-4603-A589-7422A47A8E4A}"/>
+    </a:ext>
+  </a:extLst>
+</a:theme>
 </file>
</xml_diff>